<commit_message>
Added charts.py, general improvements
</commit_message>
<xml_diff>
--- a/ppt/PPT_master.pptx
+++ b/ppt/PPT_master.pptx
@@ -14,12 +14,12 @@
   <p:notesSz cx="6858000" cy="9144000"/>
   <p:embeddedFontLst>
     <p:embeddedFont>
-      <p:font typeface="Rational Text Book" panose="00000500000000000000" charset="0"/>
+      <p:font typeface="Rational Text Book" panose="00000500000000000000" pitchFamily="50" charset="0"/>
       <p:regular r:id="rId4"/>
       <p:italic r:id="rId5"/>
     </p:embeddedFont>
     <p:embeddedFont>
-      <p:font typeface="Rational Text Medium" panose="00000600000000000000" charset="0"/>
+      <p:font typeface="Rational Text Medium" panose="00000600000000000000" pitchFamily="50" charset="0"/>
       <p:regular r:id="rId6"/>
       <p:italic r:id="rId7"/>
     </p:embeddedFont>
@@ -196,7 +196,7 @@
 <file path=ppt/revisionInfo.xml><?xml version="1.0" encoding="utf-8"?>
 <p1510:revInfo xmlns:a="http://schemas.openxmlformats.org/drawingml/2006/main" xmlns:r="http://schemas.openxmlformats.org/officeDocument/2006/relationships" xmlns:p1510="http://schemas.microsoft.com/office/powerpoint/2015/10/main">
   <p1510:revLst>
-    <p1510:client id="{E1B8C046-E90D-4CEC-9677-F2790BBE7245}" v="4" dt="2022-07-11T09:38:35.918"/>
+    <p1510:client id="{6C256C00-8B8A-400E-8344-698C85E5181A}" v="2" dt="2022-11-13T21:21:32.272"/>
   </p1510:revLst>
 </p1510:revInfo>
 </file>
@@ -305,6 +305,74 @@
       </pc:sldChg>
     </pc:docChg>
   </pc:docChgLst>
+  <pc:docChgLst>
+    <pc:chgData name="Bastian Ebeling" userId="4bcebdd3-5bf8-4ca6-8268-5bc8e3f02a03" providerId="ADAL" clId="{6C256C00-8B8A-400E-8344-698C85E5181A}"/>
+    <pc:docChg chg="undo custSel modMainMaster">
+      <pc:chgData name="Bastian Ebeling" userId="4bcebdd3-5bf8-4ca6-8268-5bc8e3f02a03" providerId="ADAL" clId="{6C256C00-8B8A-400E-8344-698C85E5181A}" dt="2022-11-13T21:22:42.179" v="32" actId="1036"/>
+      <pc:docMkLst>
+        <pc:docMk/>
+      </pc:docMkLst>
+      <pc:sldMasterChg chg="addSldLayout delSldLayout modSldLayout">
+        <pc:chgData name="Bastian Ebeling" userId="4bcebdd3-5bf8-4ca6-8268-5bc8e3f02a03" providerId="ADAL" clId="{6C256C00-8B8A-400E-8344-698C85E5181A}" dt="2022-11-13T21:22:42.179" v="32" actId="1036"/>
+        <pc:sldMasterMkLst>
+          <pc:docMk/>
+          <pc:sldMasterMk cId="397910613" sldId="2147483648"/>
+        </pc:sldMasterMkLst>
+        <pc:sldLayoutChg chg="addSp delSp modSp mod">
+          <pc:chgData name="Bastian Ebeling" userId="4bcebdd3-5bf8-4ca6-8268-5bc8e3f02a03" providerId="ADAL" clId="{6C256C00-8B8A-400E-8344-698C85E5181A}" dt="2022-11-13T21:22:42.179" v="32" actId="1036"/>
+          <pc:sldLayoutMkLst>
+            <pc:docMk/>
+            <pc:sldMasterMk cId="397910613" sldId="2147483648"/>
+            <pc:sldLayoutMk cId="1260190413" sldId="2147483654"/>
+          </pc:sldLayoutMkLst>
+          <pc:spChg chg="mod">
+            <ac:chgData name="Bastian Ebeling" userId="4bcebdd3-5bf8-4ca6-8268-5bc8e3f02a03" providerId="ADAL" clId="{6C256C00-8B8A-400E-8344-698C85E5181A}" dt="2022-11-13T21:22:42.179" v="32" actId="1036"/>
+            <ac:spMkLst>
+              <pc:docMk/>
+              <pc:sldMasterMk cId="397910613" sldId="2147483648"/>
+              <pc:sldLayoutMk cId="1260190413" sldId="2147483654"/>
+              <ac:spMk id="2" creationId="{828CF2C9-EE49-47C2-B9EB-D3AC2B08C1DC}"/>
+            </ac:spMkLst>
+          </pc:spChg>
+          <pc:spChg chg="add del">
+            <ac:chgData name="Bastian Ebeling" userId="4bcebdd3-5bf8-4ca6-8268-5bc8e3f02a03" providerId="ADAL" clId="{6C256C00-8B8A-400E-8344-698C85E5181A}" dt="2022-11-13T21:21:32.270" v="4" actId="11529"/>
+            <ac:spMkLst>
+              <pc:docMk/>
+              <pc:sldMasterMk cId="397910613" sldId="2147483648"/>
+              <pc:sldLayoutMk cId="1260190413" sldId="2147483654"/>
+              <ac:spMk id="7" creationId="{CE3BEEE0-F004-8993-9D17-DBBCE58F0A64}"/>
+            </ac:spMkLst>
+          </pc:spChg>
+          <pc:spChg chg="add mod">
+            <ac:chgData name="Bastian Ebeling" userId="4bcebdd3-5bf8-4ca6-8268-5bc8e3f02a03" providerId="ADAL" clId="{6C256C00-8B8A-400E-8344-698C85E5181A}" dt="2022-11-13T21:22:34.318" v="29" actId="1036"/>
+            <ac:spMkLst>
+              <pc:docMk/>
+              <pc:sldMasterMk cId="397910613" sldId="2147483648"/>
+              <pc:sldLayoutMk cId="1260190413" sldId="2147483654"/>
+              <ac:spMk id="8" creationId="{AFE24235-F46A-8C86-174B-223770FCE0D2}"/>
+            </ac:spMkLst>
+          </pc:spChg>
+          <pc:picChg chg="add del mod">
+            <ac:chgData name="Bastian Ebeling" userId="4bcebdd3-5bf8-4ca6-8268-5bc8e3f02a03" providerId="ADAL" clId="{6C256C00-8B8A-400E-8344-698C85E5181A}" dt="2022-11-13T21:20:28.401" v="1" actId="478"/>
+            <ac:picMkLst>
+              <pc:docMk/>
+              <pc:sldMasterMk cId="397910613" sldId="2147483648"/>
+              <pc:sldLayoutMk cId="1260190413" sldId="2147483654"/>
+              <ac:picMk id="6" creationId="{C098D82B-2D68-F6CC-D9E6-047246D91BD8}"/>
+            </ac:picMkLst>
+          </pc:picChg>
+        </pc:sldLayoutChg>
+        <pc:sldLayoutChg chg="new del mod">
+          <pc:chgData name="Bastian Ebeling" userId="4bcebdd3-5bf8-4ca6-8268-5bc8e3f02a03" providerId="ADAL" clId="{6C256C00-8B8A-400E-8344-698C85E5181A}" dt="2022-11-13T21:21:15.647" v="3" actId="11236"/>
+          <pc:sldLayoutMkLst>
+            <pc:docMk/>
+            <pc:sldMasterMk cId="397910613" sldId="2147483648"/>
+            <pc:sldLayoutMk cId="1893301411" sldId="2147483677"/>
+          </pc:sldLayoutMkLst>
+        </pc:sldLayoutChg>
+      </pc:sldMasterChg>
+    </pc:docChg>
+  </pc:docChgLst>
 </pc:chgInfo>
 </file>
 
@@ -395,7 +463,7 @@
             <a:fld id="{5DAA0D66-3E9A-418C-9508-C5B8D41A6D76}" type="datetimeFigureOut">
               <a:rPr lang="de-DE" smtClean="0"/>
               <a:pPr/>
-              <a:t>28.07.2022</a:t>
+              <a:t>13.11.2022</a:t>
             </a:fld>
             <a:endParaRPr lang="de-DE" dirty="0"/>
           </a:p>
@@ -559,7 +627,7 @@
             <a:fld id="{CC9B5890-1C2F-43CC-973D-C7CC24A4999B}" type="slidenum">
               <a:rPr lang="de-DE" smtClean="0"/>
               <a:pPr/>
-              <a:t>‹Nr.›</a:t>
+              <a:t>‹#›</a:t>
             </a:fld>
             <a:endParaRPr lang="de-DE" dirty="0"/>
           </a:p>
@@ -1568,7 +1636,7 @@
           <a:p>
             <a:fld id="{6FCCF598-6735-431D-8E94-ADFC8BC6488E}" type="datetime4">
               <a:rPr lang="en-US" smtClean="0"/>
-              <a:t>July 28, 2022</a:t>
+              <a:t>November 13, 2022</a:t>
             </a:fld>
             <a:endParaRPr lang="de-DE"/>
           </a:p>
@@ -1626,7 +1694,7 @@
           <a:p>
             <a:fld id="{8DE89A3D-C6C4-4521-AE7D-4749D53E6130}" type="slidenum">
               <a:rPr lang="de-DE" smtClean="0"/>
-              <a:t>‹Nr.›</a:t>
+              <a:t>‹#›</a:t>
             </a:fld>
             <a:endParaRPr lang="de-DE"/>
           </a:p>
@@ -2605,7 +2673,7 @@
 </file>
 
 <file path=ppt/slideLayouts/slideLayout11.xml><?xml version="1.0" encoding="utf-8"?>
-<p:sldLayout xmlns:a="http://schemas.openxmlformats.org/drawingml/2006/main" xmlns:r="http://schemas.openxmlformats.org/officeDocument/2006/relationships" xmlns:p="http://schemas.openxmlformats.org/presentationml/2006/main" type="titleOnly" preserve="1">
+<p:sldLayout xmlns:a="http://schemas.openxmlformats.org/drawingml/2006/main" xmlns:r="http://schemas.openxmlformats.org/officeDocument/2006/relationships" xmlns:p="http://schemas.openxmlformats.org/presentationml/2006/main" preserve="1" userDrawn="1">
   <p:cSld name="Nur Titel">
     <p:spTree>
       <p:nvGrpSpPr>
@@ -2637,16 +2705,20 @@
             <p:ph type="title"/>
           </p:nvPr>
         </p:nvSpPr>
-        <p:spPr/>
+        <p:spPr>
+          <a:xfrm>
+            <a:off x="407987" y="404144"/>
+            <a:ext cx="11376025" cy="504576"/>
+          </a:xfrm>
+        </p:spPr>
         <p:txBody>
           <a:bodyPr/>
           <a:lstStyle/>
           <a:p>
             <a:r>
-              <a:rPr lang="de-DE"/>
+              <a:rPr lang="de-DE" dirty="0"/>
               <a:t>Mastertitelformat bearbeiten</a:t>
             </a:r>
-            <a:endParaRPr lang="de-DE" dirty="0"/>
           </a:p>
         </p:txBody>
       </p:sp>
@@ -2673,7 +2745,7 @@
           <a:p>
             <a:fld id="{73B4ADD5-F362-440E-8475-0731BEA6722E}" type="datetime4">
               <a:rPr lang="en-US" smtClean="0"/>
-              <a:t>July 28, 2022</a:t>
+              <a:t>November 13, 2022</a:t>
             </a:fld>
             <a:endParaRPr lang="de-DE"/>
           </a:p>
@@ -2731,9 +2803,39 @@
           <a:p>
             <a:fld id="{8DE89A3D-C6C4-4521-AE7D-4749D53E6130}" type="slidenum">
               <a:rPr lang="de-DE" smtClean="0"/>
-              <a:t>‹Nr.›</a:t>
+              <a:t>‹#›</a:t>
             </a:fld>
             <a:endParaRPr lang="de-DE"/>
+          </a:p>
+        </p:txBody>
+      </p:sp>
+      <p:sp>
+        <p:nvSpPr>
+          <p:cNvPr id="8" name="Picture Placeholder 7">
+            <a:extLst>
+              <a:ext uri="{FF2B5EF4-FFF2-40B4-BE49-F238E27FC236}">
+                <a16:creationId xmlns:a16="http://schemas.microsoft.com/office/drawing/2014/main" id="{AFE24235-F46A-8C86-174B-223770FCE0D2}"/>
+              </a:ext>
+            </a:extLst>
+          </p:cNvPr>
+          <p:cNvSpPr>
+            <a:spLocks noGrp="1"/>
+          </p:cNvSpPr>
+          <p:nvPr>
+            <p:ph type="pic" sz="quarter" idx="13"/>
+          </p:nvPr>
+        </p:nvSpPr>
+        <p:spPr>
+          <a:xfrm>
+            <a:off x="65999" y="909320"/>
+            <a:ext cx="12060000" cy="5400000"/>
+          </a:xfrm>
+        </p:spPr>
+        <p:txBody>
+          <a:bodyPr/>
+          <a:lstStyle/>
+          <a:p>
+            <a:endParaRPr lang="en-US" dirty="0"/>
           </a:p>
         </p:txBody>
       </p:sp>
@@ -2790,7 +2892,7 @@
           <a:p>
             <a:fld id="{AEABD364-9D21-46A6-8558-A0B17CB15E93}" type="datetime4">
               <a:rPr lang="en-US" smtClean="0"/>
-              <a:t>July 28, 2022</a:t>
+              <a:t>November 13, 2022</a:t>
             </a:fld>
             <a:endParaRPr lang="de-DE"/>
           </a:p>
@@ -2848,7 +2950,7 @@
           <a:p>
             <a:fld id="{8DE89A3D-C6C4-4521-AE7D-4749D53E6130}" type="slidenum">
               <a:rPr lang="de-DE" smtClean="0"/>
-              <a:t>‹Nr.›</a:t>
+              <a:t>‹#›</a:t>
             </a:fld>
             <a:endParaRPr lang="de-DE"/>
           </a:p>
@@ -3058,7 +3160,7 @@
           <a:p>
             <a:fld id="{66B439B0-6B12-45B7-BA13-D4A4914AFA58}" type="datetime4">
               <a:rPr lang="en-US" smtClean="0"/>
-              <a:t>July 28, 2022</a:t>
+              <a:t>November 13, 2022</a:t>
             </a:fld>
             <a:endParaRPr lang="de-DE"/>
           </a:p>
@@ -3116,7 +3218,7 @@
           <a:p>
             <a:fld id="{8DE89A3D-C6C4-4521-AE7D-4749D53E6130}" type="slidenum">
               <a:rPr lang="de-DE" smtClean="0"/>
-              <a:t>‹Nr.›</a:t>
+              <a:t>‹#›</a:t>
             </a:fld>
             <a:endParaRPr lang="de-DE"/>
           </a:p>
@@ -3393,7 +3495,7 @@
           <a:p>
             <a:fld id="{EBFA47B6-4EEA-46E9-89F9-3763A0686498}" type="datetime4">
               <a:rPr lang="en-US" smtClean="0"/>
-              <a:t>July 28, 2022</a:t>
+              <a:t>November 13, 2022</a:t>
             </a:fld>
             <a:endParaRPr lang="de-DE" dirty="0"/>
           </a:p>
@@ -3460,7 +3562,7 @@
             <a:fld id="{8DE89A3D-C6C4-4521-AE7D-4749D53E6130}" type="slidenum">
               <a:rPr lang="de-DE" smtClean="0"/>
               <a:pPr/>
-              <a:t>‹Nr.›</a:t>
+              <a:t>‹#›</a:t>
             </a:fld>
             <a:endParaRPr lang="de-DE"/>
           </a:p>
@@ -3938,7 +4040,7 @@
           <a:p>
             <a:fld id="{4E10FC28-BD7A-4483-897A-936283D2CE5B}" type="datetime4">
               <a:rPr lang="en-US" smtClean="0"/>
-              <a:t>July 28, 2022</a:t>
+              <a:t>November 13, 2022</a:t>
             </a:fld>
             <a:endParaRPr lang="de-DE"/>
           </a:p>
@@ -3996,7 +4098,7 @@
           <a:p>
             <a:fld id="{8DE89A3D-C6C4-4521-AE7D-4749D53E6130}" type="slidenum">
               <a:rPr lang="de-DE" smtClean="0"/>
-              <a:t>‹Nr.›</a:t>
+              <a:t>‹#›</a:t>
             </a:fld>
             <a:endParaRPr lang="de-DE"/>
           </a:p>
@@ -19720,7 +19822,7 @@
           <a:p>
             <a:fld id="{3F2707FC-CB14-4199-99D5-E6E98A6B98E8}" type="datetime4">
               <a:rPr lang="en-US" smtClean="0"/>
-              <a:t>July 28, 2022</a:t>
+              <a:t>November 13, 2022</a:t>
             </a:fld>
             <a:endParaRPr lang="de-DE"/>
           </a:p>
@@ -19778,7 +19880,7 @@
           <a:p>
             <a:fld id="{8DE89A3D-C6C4-4521-AE7D-4749D53E6130}" type="slidenum">
               <a:rPr lang="de-DE" smtClean="0"/>
-              <a:t>‹Nr.›</a:t>
+              <a:t>‹#›</a:t>
             </a:fld>
             <a:endParaRPr lang="de-DE"/>
           </a:p>
@@ -19923,7 +20025,7 @@
           <a:p>
             <a:fld id="{EF31B3D3-E984-4123-ACFA-99EB009E1618}" type="datetime4">
               <a:rPr lang="en-US" smtClean="0"/>
-              <a:t>July 28, 2022</a:t>
+              <a:t>November 13, 2022</a:t>
             </a:fld>
             <a:endParaRPr lang="de-DE"/>
           </a:p>
@@ -19981,7 +20083,7 @@
           <a:p>
             <a:fld id="{8DE89A3D-C6C4-4521-AE7D-4749D53E6130}" type="slidenum">
               <a:rPr lang="de-DE" smtClean="0"/>
-              <a:t>‹Nr.›</a:t>
+              <a:t>‹#›</a:t>
             </a:fld>
             <a:endParaRPr lang="de-DE"/>
           </a:p>
@@ -20045,7 +20147,7 @@
           <a:p>
             <a:fld id="{63F36FD1-AD41-4708-BC05-945A216E8735}" type="datetime4">
               <a:rPr lang="en-US" smtClean="0"/>
-              <a:t>July 28, 2022</a:t>
+              <a:t>November 13, 2022</a:t>
             </a:fld>
             <a:endParaRPr lang="de-DE"/>
           </a:p>
@@ -20103,7 +20205,7 @@
           <a:p>
             <a:fld id="{8DE89A3D-C6C4-4521-AE7D-4749D53E6130}" type="slidenum">
               <a:rPr lang="de-DE" smtClean="0"/>
-              <a:t>‹Nr.›</a:t>
+              <a:t>‹#›</a:t>
             </a:fld>
             <a:endParaRPr lang="de-DE"/>
           </a:p>
@@ -20402,7 +20504,7 @@
           <a:p>
             <a:fld id="{F57DB616-4CFF-4D0B-AEF5-72635AC81B81}" type="datetime4">
               <a:rPr lang="en-US" smtClean="0"/>
-              <a:t>July 28, 2022</a:t>
+              <a:t>November 13, 2022</a:t>
             </a:fld>
             <a:endParaRPr lang="de-DE"/>
           </a:p>
@@ -20460,7 +20562,7 @@
           <a:p>
             <a:fld id="{8DE89A3D-C6C4-4521-AE7D-4749D53E6130}" type="slidenum">
               <a:rPr lang="de-DE" smtClean="0"/>
-              <a:t>‹Nr.›</a:t>
+              <a:t>‹#›</a:t>
             </a:fld>
             <a:endParaRPr lang="de-DE"/>
           </a:p>
@@ -20861,7 +20963,7 @@
           <a:p>
             <a:fld id="{6ADB5DE5-ED93-4FBD-ABEB-886FC497F9CD}" type="datetime4">
               <a:rPr lang="en-US" smtClean="0"/>
-              <a:t>July 28, 2022</a:t>
+              <a:t>November 13, 2022</a:t>
             </a:fld>
             <a:endParaRPr lang="de-DE"/>
           </a:p>
@@ -20919,7 +21021,7 @@
           <a:p>
             <a:fld id="{8DE89A3D-C6C4-4521-AE7D-4749D53E6130}" type="slidenum">
               <a:rPr lang="de-DE" smtClean="0"/>
-              <a:t>‹Nr.›</a:t>
+              <a:t>‹#›</a:t>
             </a:fld>
             <a:endParaRPr lang="de-DE"/>
           </a:p>
@@ -39699,7 +39801,7 @@
           <a:p>
             <a:fld id="{7AC2745F-CC38-4C8E-ABA1-9E0765028C3F}" type="datetime4">
               <a:rPr lang="en-US" smtClean="0"/>
-              <a:t>July 28, 2022</a:t>
+              <a:t>November 13, 2022</a:t>
             </a:fld>
             <a:endParaRPr lang="de-DE"/>
           </a:p>
@@ -39757,7 +39859,7 @@
           <a:p>
             <a:fld id="{8DE89A3D-C6C4-4521-AE7D-4749D53E6130}" type="slidenum">
               <a:rPr lang="de-DE" smtClean="0"/>
-              <a:t>‹Nr.›</a:t>
+              <a:t>‹#›</a:t>
             </a:fld>
             <a:endParaRPr lang="de-DE"/>
           </a:p>
@@ -40331,7 +40433,7 @@
           <a:p>
             <a:fld id="{108F5090-2ED9-45B3-AF5C-3405703B037F}" type="datetime4">
               <a:rPr lang="en-US" smtClean="0"/>
-              <a:t>July 28, 2022</a:t>
+              <a:t>November 13, 2022</a:t>
             </a:fld>
             <a:endParaRPr lang="de-DE"/>
           </a:p>
@@ -40389,7 +40491,7 @@
           <a:p>
             <a:fld id="{8DE89A3D-C6C4-4521-AE7D-4749D53E6130}" type="slidenum">
               <a:rPr lang="de-DE" smtClean="0"/>
-              <a:t>‹Nr.›</a:t>
+              <a:t>‹#›</a:t>
             </a:fld>
             <a:endParaRPr lang="de-DE"/>
           </a:p>
@@ -40777,7 +40879,7 @@
           <a:p>
             <a:fld id="{FBF80186-DF4E-457C-9C04-2C606FD0AA66}" type="datetime4">
               <a:rPr lang="en-US" smtClean="0"/>
-              <a:t>July 28, 2022</a:t>
+              <a:t>November 13, 2022</a:t>
             </a:fld>
             <a:endParaRPr lang="de-DE"/>
           </a:p>
@@ -40835,7 +40937,7 @@
           <a:p>
             <a:fld id="{8DE89A3D-C6C4-4521-AE7D-4749D53E6130}" type="slidenum">
               <a:rPr lang="de-DE" smtClean="0"/>
-              <a:t>‹Nr.›</a:t>
+              <a:t>‹#›</a:t>
             </a:fld>
             <a:endParaRPr lang="de-DE"/>
           </a:p>
@@ -41437,7 +41539,7 @@
           <a:p>
             <a:fld id="{7CE18A8A-CFC4-444F-B700-1F5E27CBBF93}" type="datetime4">
               <a:rPr lang="en-US" smtClean="0"/>
-              <a:t>July 28, 2022</a:t>
+              <a:t>November 13, 2022</a:t>
             </a:fld>
             <a:endParaRPr lang="de-DE"/>
           </a:p>
@@ -41495,7 +41597,7 @@
           <a:p>
             <a:fld id="{8DE89A3D-C6C4-4521-AE7D-4749D53E6130}" type="slidenum">
               <a:rPr lang="de-DE" smtClean="0"/>
-              <a:t>‹Nr.›</a:t>
+              <a:t>‹#›</a:t>
             </a:fld>
             <a:endParaRPr lang="de-DE"/>
           </a:p>
@@ -42094,7 +42196,7 @@
           <a:p>
             <a:fld id="{89D45D11-DE08-47A0-B5CE-C61E71C015A5}" type="datetime4">
               <a:rPr lang="en-US" smtClean="0"/>
-              <a:t>July 28, 2022</a:t>
+              <a:t>November 13, 2022</a:t>
             </a:fld>
             <a:endParaRPr lang="de-DE" dirty="0"/>
           </a:p>
@@ -42161,7 +42263,7 @@
             <a:fld id="{8DE89A3D-C6C4-4521-AE7D-4749D53E6130}" type="slidenum">
               <a:rPr lang="de-DE" smtClean="0"/>
               <a:pPr/>
-              <a:t>‹Nr.›</a:t>
+              <a:t>‹#›</a:t>
             </a:fld>
             <a:endParaRPr lang="de-DE" dirty="0"/>
           </a:p>
@@ -42265,7 +42367,7 @@
           <a:p>
             <a:fld id="{3FC4EDF4-751A-4A83-B32D-B6BD44E085C9}" type="datetime4">
               <a:rPr lang="en-US" smtClean="0"/>
-              <a:t>July 28, 2022</a:t>
+              <a:t>November 13, 2022</a:t>
             </a:fld>
             <a:endParaRPr lang="de-DE"/>
           </a:p>
@@ -42323,7 +42425,7 @@
           <a:p>
             <a:fld id="{8DE89A3D-C6C4-4521-AE7D-4749D53E6130}" type="slidenum">
               <a:rPr lang="de-DE" smtClean="0"/>
-              <a:t>‹Nr.›</a:t>
+              <a:t>‹#›</a:t>
             </a:fld>
             <a:endParaRPr lang="de-DE"/>
           </a:p>
@@ -42844,7 +42946,7 @@
           <a:p>
             <a:fld id="{FBCC0F41-352F-42E2-913B-67B4F5CEF3D1}" type="datetime4">
               <a:rPr lang="en-US" smtClean="0"/>
-              <a:t>July 28, 2022</a:t>
+              <a:t>November 13, 2022</a:t>
             </a:fld>
             <a:endParaRPr lang="de-DE"/>
           </a:p>
@@ -42902,7 +43004,7 @@
           <a:p>
             <a:fld id="{8DE89A3D-C6C4-4521-AE7D-4749D53E6130}" type="slidenum">
               <a:rPr lang="de-DE" smtClean="0"/>
-              <a:t>‹Nr.›</a:t>
+              <a:t>‹#›</a:t>
             </a:fld>
             <a:endParaRPr lang="de-DE"/>
           </a:p>
@@ -43564,7 +43666,7 @@
           <a:p>
             <a:fld id="{F5BF386D-06BC-46D5-BF27-0A42B36DBD52}" type="datetime4">
               <a:rPr lang="en-US" smtClean="0"/>
-              <a:t>July 28, 2022</a:t>
+              <a:t>November 13, 2022</a:t>
             </a:fld>
             <a:endParaRPr lang="de-DE" dirty="0"/>
           </a:p>
@@ -43660,7 +43762,7 @@
             <a:fld id="{8DE89A3D-C6C4-4521-AE7D-4749D53E6130}" type="slidenum">
               <a:rPr lang="de-DE" smtClean="0"/>
               <a:pPr/>
-              <a:t>‹Nr.›</a:t>
+              <a:t>‹#›</a:t>
             </a:fld>
             <a:endParaRPr lang="de-DE" dirty="0"/>
           </a:p>

</xml_diff>

<commit_message>
added density and pptx
</commit_message>
<xml_diff>
--- a/ppt/PPT_master.pptx
+++ b/ppt/PPT_master.pptx
@@ -5,23 +5,20 @@
     <p:sldMasterId id="2147483648" r:id="rId1"/>
   </p:sldMasterIdLst>
   <p:notesMasterIdLst>
-    <p:notesMasterId r:id="rId3"/>
+    <p:notesMasterId r:id="rId2"/>
   </p:notesMasterIdLst>
-  <p:sldIdLst>
-    <p:sldId id="258" r:id="rId2"/>
-  </p:sldIdLst>
   <p:sldSz cx="12192000" cy="6858000"/>
   <p:notesSz cx="6858000" cy="9144000"/>
   <p:embeddedFontLst>
     <p:embeddedFont>
       <p:font typeface="Rational Text Book" panose="00000500000000000000" pitchFamily="50" charset="0"/>
-      <p:regular r:id="rId4"/>
-      <p:italic r:id="rId5"/>
+      <p:regular r:id="rId3"/>
+      <p:italic r:id="rId4"/>
     </p:embeddedFont>
     <p:embeddedFont>
       <p:font typeface="Rational Text Medium" panose="00000600000000000000" pitchFamily="50" charset="0"/>
-      <p:regular r:id="rId6"/>
-      <p:italic r:id="rId7"/>
+      <p:regular r:id="rId5"/>
+      <p:italic r:id="rId6"/>
     </p:embeddedFont>
   </p:embeddedFontLst>
   <p:defaultTextStyle>
@@ -196,7 +193,7 @@
 <file path=ppt/revisionInfo.xml><?xml version="1.0" encoding="utf-8"?>
 <p1510:revInfo xmlns:a="http://schemas.openxmlformats.org/drawingml/2006/main" xmlns:r="http://schemas.openxmlformats.org/officeDocument/2006/relationships" xmlns:p1510="http://schemas.microsoft.com/office/powerpoint/2015/10/main">
   <p1510:revLst>
-    <p1510:client id="{6C256C00-8B8A-400E-8344-698C85E5181A}" v="2" dt="2022-11-13T21:21:32.272"/>
+    <p1510:client id="{1F7BBBC2-2E3E-41B6-89E8-1018C1EBA732}" v="1" dt="2023-02-22T22:22:37.898"/>
   </p1510:revLst>
 </p1510:revInfo>
 </file>
@@ -303,6 +300,88 @@
           <pc:sldMk cId="419776492" sldId="258"/>
         </pc:sldMkLst>
       </pc:sldChg>
+    </pc:docChg>
+  </pc:docChgLst>
+  <pc:docChgLst>
+    <pc:chgData name="Ebeling, Bastian" userId="4bcebdd3-5bf8-4ca6-8268-5bc8e3f02a03" providerId="ADAL" clId="{1F7BBBC2-2E3E-41B6-89E8-1018C1EBA732}"/>
+    <pc:docChg chg="custSel addSld delSld modSld modMainMaster">
+      <pc:chgData name="Ebeling, Bastian" userId="4bcebdd3-5bf8-4ca6-8268-5bc8e3f02a03" providerId="ADAL" clId="{1F7BBBC2-2E3E-41B6-89E8-1018C1EBA732}" dt="2023-02-22T22:30:51.671" v="123" actId="47"/>
+      <pc:docMkLst>
+        <pc:docMk/>
+      </pc:docMkLst>
+      <pc:sldChg chg="new del">
+        <pc:chgData name="Ebeling, Bastian" userId="4bcebdd3-5bf8-4ca6-8268-5bc8e3f02a03" providerId="ADAL" clId="{1F7BBBC2-2E3E-41B6-89E8-1018C1EBA732}" dt="2023-02-22T22:30:51.671" v="123" actId="47"/>
+        <pc:sldMkLst>
+          <pc:docMk/>
+          <pc:sldMk cId="1861960335" sldId="256"/>
+        </pc:sldMkLst>
+      </pc:sldChg>
+      <pc:sldChg chg="del">
+        <pc:chgData name="Ebeling, Bastian" userId="4bcebdd3-5bf8-4ca6-8268-5bc8e3f02a03" providerId="ADAL" clId="{1F7BBBC2-2E3E-41B6-89E8-1018C1EBA732}" dt="2023-02-22T21:23:50.956" v="0" actId="47"/>
+        <pc:sldMkLst>
+          <pc:docMk/>
+          <pc:sldMk cId="419776492" sldId="258"/>
+        </pc:sldMkLst>
+      </pc:sldChg>
+      <pc:sldMasterChg chg="addSldLayout modSldLayout">
+        <pc:chgData name="Ebeling, Bastian" userId="4bcebdd3-5bf8-4ca6-8268-5bc8e3f02a03" providerId="ADAL" clId="{1F7BBBC2-2E3E-41B6-89E8-1018C1EBA732}" dt="2023-02-22T22:23:02.524" v="121" actId="14100"/>
+        <pc:sldMasterMkLst>
+          <pc:docMk/>
+          <pc:sldMasterMk cId="397910613" sldId="2147483648"/>
+        </pc:sldMasterMkLst>
+        <pc:sldLayoutChg chg="modSp add mod modTransition">
+          <pc:chgData name="Ebeling, Bastian" userId="4bcebdd3-5bf8-4ca6-8268-5bc8e3f02a03" providerId="ADAL" clId="{1F7BBBC2-2E3E-41B6-89E8-1018C1EBA732}" dt="2023-02-22T22:12:39.972" v="112" actId="1076"/>
+          <pc:sldLayoutMkLst>
+            <pc:docMk/>
+            <pc:sldMasterMk cId="397910613" sldId="2147483648"/>
+            <pc:sldLayoutMk cId="1106966816" sldId="2147483677"/>
+          </pc:sldLayoutMkLst>
+          <pc:spChg chg="mod">
+            <ac:chgData name="Ebeling, Bastian" userId="4bcebdd3-5bf8-4ca6-8268-5bc8e3f02a03" providerId="ADAL" clId="{1F7BBBC2-2E3E-41B6-89E8-1018C1EBA732}" dt="2023-02-22T22:12:39.972" v="112" actId="1076"/>
+            <ac:spMkLst>
+              <pc:docMk/>
+              <pc:sldMasterMk cId="397910613" sldId="2147483648"/>
+              <pc:sldLayoutMk cId="1106966816" sldId="2147483677"/>
+              <ac:spMk id="8" creationId="{AFE24235-F46A-8C86-174B-223770FCE0D2}"/>
+            </ac:spMkLst>
+          </pc:spChg>
+        </pc:sldLayoutChg>
+        <pc:sldLayoutChg chg="addSp delSp modSp add mod modTransition">
+          <pc:chgData name="Ebeling, Bastian" userId="4bcebdd3-5bf8-4ca6-8268-5bc8e3f02a03" providerId="ADAL" clId="{1F7BBBC2-2E3E-41B6-89E8-1018C1EBA732}" dt="2023-02-22T22:23:02.524" v="121" actId="14100"/>
+          <pc:sldLayoutMkLst>
+            <pc:docMk/>
+            <pc:sldMasterMk cId="397910613" sldId="2147483648"/>
+            <pc:sldLayoutMk cId="1544370225" sldId="2147483678"/>
+          </pc:sldLayoutMkLst>
+          <pc:spChg chg="add del">
+            <ac:chgData name="Ebeling, Bastian" userId="4bcebdd3-5bf8-4ca6-8268-5bc8e3f02a03" providerId="ADAL" clId="{1F7BBBC2-2E3E-41B6-89E8-1018C1EBA732}" dt="2023-02-22T22:22:37.896" v="114" actId="11529"/>
+            <ac:spMkLst>
+              <pc:docMk/>
+              <pc:sldMasterMk cId="397910613" sldId="2147483648"/>
+              <pc:sldLayoutMk cId="1544370225" sldId="2147483678"/>
+              <ac:spMk id="6" creationId="{C698443E-126B-F67E-1018-51E6801F3E32}"/>
+            </ac:spMkLst>
+          </pc:spChg>
+          <pc:spChg chg="add mod">
+            <ac:chgData name="Ebeling, Bastian" userId="4bcebdd3-5bf8-4ca6-8268-5bc8e3f02a03" providerId="ADAL" clId="{1F7BBBC2-2E3E-41B6-89E8-1018C1EBA732}" dt="2023-02-22T22:23:02.524" v="121" actId="14100"/>
+            <ac:spMkLst>
+              <pc:docMk/>
+              <pc:sldMasterMk cId="397910613" sldId="2147483648"/>
+              <pc:sldLayoutMk cId="1544370225" sldId="2147483678"/>
+              <ac:spMk id="7" creationId="{897ED4AD-BA67-4310-81EB-A887513B2C93}"/>
+            </ac:spMkLst>
+          </pc:spChg>
+          <pc:spChg chg="del">
+            <ac:chgData name="Ebeling, Bastian" userId="4bcebdd3-5bf8-4ca6-8268-5bc8e3f02a03" providerId="ADAL" clId="{1F7BBBC2-2E3E-41B6-89E8-1018C1EBA732}" dt="2023-02-22T22:22:43.383" v="116" actId="478"/>
+            <ac:spMkLst>
+              <pc:docMk/>
+              <pc:sldMasterMk cId="397910613" sldId="2147483648"/>
+              <pc:sldLayoutMk cId="1544370225" sldId="2147483678"/>
+              <ac:spMk id="8" creationId="{AFE24235-F46A-8C86-174B-223770FCE0D2}"/>
+            </ac:spMkLst>
+          </pc:spChg>
+        </pc:sldLayoutChg>
+      </pc:sldMasterChg>
     </pc:docChg>
   </pc:docChgLst>
   <pc:docChgLst>
@@ -463,7 +542,7 @@
             <a:fld id="{5DAA0D66-3E9A-418C-9508-C5B8D41A6D76}" type="datetimeFigureOut">
               <a:rPr lang="de-DE" smtClean="0"/>
               <a:pPr/>
-              <a:t>13.11.2022</a:t>
+              <a:t>22.02.2023</a:t>
             </a:fld>
             <a:endParaRPr lang="de-DE" dirty="0"/>
           </a:p>
@@ -1636,7 +1715,7 @@
           <a:p>
             <a:fld id="{6FCCF598-6735-431D-8E94-ADFC8BC6488E}" type="datetime4">
               <a:rPr lang="en-US" smtClean="0"/>
-              <a:t>November 13, 2022</a:t>
+              <a:t>February 22, 2023</a:t>
             </a:fld>
             <a:endParaRPr lang="de-DE"/>
           </a:p>
@@ -2745,7 +2824,7 @@
           <a:p>
             <a:fld id="{73B4ADD5-F362-440E-8475-0731BEA6722E}" type="datetime4">
               <a:rPr lang="en-US" smtClean="0"/>
-              <a:t>November 13, 2022</a:t>
+              <a:t>February 22, 2023</a:t>
             </a:fld>
             <a:endParaRPr lang="de-DE"/>
           </a:p>
@@ -2854,6 +2933,366 @@
 
 <file path=ppt/slideLayouts/slideLayout12.xml><?xml version="1.0" encoding="utf-8"?>
 <p:sldLayout xmlns:a="http://schemas.openxmlformats.org/drawingml/2006/main" xmlns:r="http://schemas.openxmlformats.org/officeDocument/2006/relationships" xmlns:p="http://schemas.openxmlformats.org/presentationml/2006/main" preserve="1" userDrawn="1">
+  <p:cSld name="1_Nur Titel">
+    <p:spTree>
+      <p:nvGrpSpPr>
+        <p:cNvPr id="1" name=""/>
+        <p:cNvGrpSpPr/>
+        <p:nvPr/>
+      </p:nvGrpSpPr>
+      <p:grpSpPr>
+        <a:xfrm>
+          <a:off x="0" y="0"/>
+          <a:ext cx="0" cy="0"/>
+          <a:chOff x="0" y="0"/>
+          <a:chExt cx="0" cy="0"/>
+        </a:xfrm>
+      </p:grpSpPr>
+      <p:sp>
+        <p:nvSpPr>
+          <p:cNvPr id="2" name="Title 1">
+            <a:extLst>
+              <a:ext uri="{FF2B5EF4-FFF2-40B4-BE49-F238E27FC236}">
+                <a16:creationId xmlns:a16="http://schemas.microsoft.com/office/drawing/2014/main" id="{828CF2C9-EE49-47C2-B9EB-D3AC2B08C1DC}"/>
+              </a:ext>
+            </a:extLst>
+          </p:cNvPr>
+          <p:cNvSpPr>
+            <a:spLocks noGrp="1"/>
+          </p:cNvSpPr>
+          <p:nvPr>
+            <p:ph type="title"/>
+          </p:nvPr>
+        </p:nvSpPr>
+        <p:spPr>
+          <a:xfrm>
+            <a:off x="407987" y="404144"/>
+            <a:ext cx="11376025" cy="504576"/>
+          </a:xfrm>
+        </p:spPr>
+        <p:txBody>
+          <a:bodyPr/>
+          <a:lstStyle/>
+          <a:p>
+            <a:r>
+              <a:rPr lang="de-DE" dirty="0"/>
+              <a:t>Mastertitelformat bearbeiten</a:t>
+            </a:r>
+          </a:p>
+        </p:txBody>
+      </p:sp>
+      <p:sp>
+        <p:nvSpPr>
+          <p:cNvPr id="3" name="Date Placeholder 2">
+            <a:extLst>
+              <a:ext uri="{FF2B5EF4-FFF2-40B4-BE49-F238E27FC236}">
+                <a16:creationId xmlns:a16="http://schemas.microsoft.com/office/drawing/2014/main" id="{E67EE6D0-2594-46E3-9287-BA25C41835AD}"/>
+              </a:ext>
+            </a:extLst>
+          </p:cNvPr>
+          <p:cNvSpPr>
+            <a:spLocks noGrp="1"/>
+          </p:cNvSpPr>
+          <p:nvPr>
+            <p:ph type="dt" sz="half" idx="10"/>
+          </p:nvPr>
+        </p:nvSpPr>
+        <p:spPr/>
+        <p:txBody>
+          <a:bodyPr/>
+          <a:lstStyle/>
+          <a:p>
+            <a:fld id="{73B4ADD5-F362-440E-8475-0731BEA6722E}" type="datetime4">
+              <a:rPr lang="en-US" smtClean="0"/>
+              <a:t>February 22, 2023</a:t>
+            </a:fld>
+            <a:endParaRPr lang="de-DE"/>
+          </a:p>
+        </p:txBody>
+      </p:sp>
+      <p:sp>
+        <p:nvSpPr>
+          <p:cNvPr id="4" name="Footer Placeholder 3">
+            <a:extLst>
+              <a:ext uri="{FF2B5EF4-FFF2-40B4-BE49-F238E27FC236}">
+                <a16:creationId xmlns:a16="http://schemas.microsoft.com/office/drawing/2014/main" id="{10745D3E-F564-4E6F-B68A-B13E4AC6E539}"/>
+              </a:ext>
+            </a:extLst>
+          </p:cNvPr>
+          <p:cNvSpPr>
+            <a:spLocks noGrp="1"/>
+          </p:cNvSpPr>
+          <p:nvPr>
+            <p:ph type="ftr" sz="quarter" idx="11"/>
+          </p:nvPr>
+        </p:nvSpPr>
+        <p:spPr/>
+        <p:txBody>
+          <a:bodyPr/>
+          <a:lstStyle/>
+          <a:p>
+            <a:r>
+              <a:rPr lang="en-US" dirty="0"/>
+              <a:t>CONFIDENTIAL – INTERNAL USE ONLY</a:t>
+            </a:r>
+            <a:endParaRPr lang="de-DE" dirty="0"/>
+          </a:p>
+        </p:txBody>
+      </p:sp>
+      <p:sp>
+        <p:nvSpPr>
+          <p:cNvPr id="5" name="Slide Number Placeholder 4">
+            <a:extLst>
+              <a:ext uri="{FF2B5EF4-FFF2-40B4-BE49-F238E27FC236}">
+                <a16:creationId xmlns:a16="http://schemas.microsoft.com/office/drawing/2014/main" id="{69FEF3B3-E8F7-485E-871F-5F7162A30614}"/>
+              </a:ext>
+            </a:extLst>
+          </p:cNvPr>
+          <p:cNvSpPr>
+            <a:spLocks noGrp="1"/>
+          </p:cNvSpPr>
+          <p:nvPr>
+            <p:ph type="sldNum" sz="quarter" idx="12"/>
+          </p:nvPr>
+        </p:nvSpPr>
+        <p:spPr/>
+        <p:txBody>
+          <a:bodyPr/>
+          <a:lstStyle/>
+          <a:p>
+            <a:fld id="{8DE89A3D-C6C4-4521-AE7D-4749D53E6130}" type="slidenum">
+              <a:rPr lang="de-DE" smtClean="0"/>
+              <a:t>‹#›</a:t>
+            </a:fld>
+            <a:endParaRPr lang="de-DE"/>
+          </a:p>
+        </p:txBody>
+      </p:sp>
+      <p:sp>
+        <p:nvSpPr>
+          <p:cNvPr id="8" name="Picture Placeholder 7">
+            <a:extLst>
+              <a:ext uri="{FF2B5EF4-FFF2-40B4-BE49-F238E27FC236}">
+                <a16:creationId xmlns:a16="http://schemas.microsoft.com/office/drawing/2014/main" id="{AFE24235-F46A-8C86-174B-223770FCE0D2}"/>
+              </a:ext>
+            </a:extLst>
+          </p:cNvPr>
+          <p:cNvSpPr>
+            <a:spLocks noGrp="1"/>
+          </p:cNvSpPr>
+          <p:nvPr>
+            <p:ph type="pic" sz="quarter" idx="13"/>
+          </p:nvPr>
+        </p:nvSpPr>
+        <p:spPr>
+          <a:xfrm>
+            <a:off x="2045999" y="908720"/>
+            <a:ext cx="8100000" cy="5400000"/>
+          </a:xfrm>
+        </p:spPr>
+        <p:txBody>
+          <a:bodyPr/>
+          <a:lstStyle/>
+          <a:p>
+            <a:endParaRPr lang="en-US" dirty="0"/>
+          </a:p>
+        </p:txBody>
+      </p:sp>
+    </p:spTree>
+    <p:extLst>
+      <p:ext uri="{BB962C8B-B14F-4D97-AF65-F5344CB8AC3E}">
+        <p14:creationId xmlns:p14="http://schemas.microsoft.com/office/powerpoint/2010/main" val="1106966816"/>
+      </p:ext>
+    </p:extLst>
+  </p:cSld>
+  <p:clrMapOvr>
+    <a:masterClrMapping/>
+  </p:clrMapOvr>
+</p:sldLayout>
+</file>
+
+<file path=ppt/slideLayouts/slideLayout13.xml><?xml version="1.0" encoding="utf-8"?>
+<p:sldLayout xmlns:a="http://schemas.openxmlformats.org/drawingml/2006/main" xmlns:r="http://schemas.openxmlformats.org/officeDocument/2006/relationships" xmlns:p="http://schemas.openxmlformats.org/presentationml/2006/main" preserve="1" userDrawn="1">
+  <p:cSld name="2_Nur Titel">
+    <p:spTree>
+      <p:nvGrpSpPr>
+        <p:cNvPr id="1" name=""/>
+        <p:cNvGrpSpPr/>
+        <p:nvPr/>
+      </p:nvGrpSpPr>
+      <p:grpSpPr>
+        <a:xfrm>
+          <a:off x="0" y="0"/>
+          <a:ext cx="0" cy="0"/>
+          <a:chOff x="0" y="0"/>
+          <a:chExt cx="0" cy="0"/>
+        </a:xfrm>
+      </p:grpSpPr>
+      <p:sp>
+        <p:nvSpPr>
+          <p:cNvPr id="2" name="Title 1">
+            <a:extLst>
+              <a:ext uri="{FF2B5EF4-FFF2-40B4-BE49-F238E27FC236}">
+                <a16:creationId xmlns:a16="http://schemas.microsoft.com/office/drawing/2014/main" id="{828CF2C9-EE49-47C2-B9EB-D3AC2B08C1DC}"/>
+              </a:ext>
+            </a:extLst>
+          </p:cNvPr>
+          <p:cNvSpPr>
+            <a:spLocks noGrp="1"/>
+          </p:cNvSpPr>
+          <p:nvPr>
+            <p:ph type="title"/>
+          </p:nvPr>
+        </p:nvSpPr>
+        <p:spPr>
+          <a:xfrm>
+            <a:off x="407987" y="404144"/>
+            <a:ext cx="11376025" cy="504576"/>
+          </a:xfrm>
+        </p:spPr>
+        <p:txBody>
+          <a:bodyPr/>
+          <a:lstStyle/>
+          <a:p>
+            <a:r>
+              <a:rPr lang="de-DE" dirty="0"/>
+              <a:t>Mastertitelformat bearbeiten</a:t>
+            </a:r>
+          </a:p>
+        </p:txBody>
+      </p:sp>
+      <p:sp>
+        <p:nvSpPr>
+          <p:cNvPr id="3" name="Date Placeholder 2">
+            <a:extLst>
+              <a:ext uri="{FF2B5EF4-FFF2-40B4-BE49-F238E27FC236}">
+                <a16:creationId xmlns:a16="http://schemas.microsoft.com/office/drawing/2014/main" id="{E67EE6D0-2594-46E3-9287-BA25C41835AD}"/>
+              </a:ext>
+            </a:extLst>
+          </p:cNvPr>
+          <p:cNvSpPr>
+            <a:spLocks noGrp="1"/>
+          </p:cNvSpPr>
+          <p:nvPr>
+            <p:ph type="dt" sz="half" idx="10"/>
+          </p:nvPr>
+        </p:nvSpPr>
+        <p:spPr/>
+        <p:txBody>
+          <a:bodyPr/>
+          <a:lstStyle/>
+          <a:p>
+            <a:fld id="{73B4ADD5-F362-440E-8475-0731BEA6722E}" type="datetime4">
+              <a:rPr lang="en-US" smtClean="0"/>
+              <a:t>February 22, 2023</a:t>
+            </a:fld>
+            <a:endParaRPr lang="de-DE"/>
+          </a:p>
+        </p:txBody>
+      </p:sp>
+      <p:sp>
+        <p:nvSpPr>
+          <p:cNvPr id="4" name="Footer Placeholder 3">
+            <a:extLst>
+              <a:ext uri="{FF2B5EF4-FFF2-40B4-BE49-F238E27FC236}">
+                <a16:creationId xmlns:a16="http://schemas.microsoft.com/office/drawing/2014/main" id="{10745D3E-F564-4E6F-B68A-B13E4AC6E539}"/>
+              </a:ext>
+            </a:extLst>
+          </p:cNvPr>
+          <p:cNvSpPr>
+            <a:spLocks noGrp="1"/>
+          </p:cNvSpPr>
+          <p:nvPr>
+            <p:ph type="ftr" sz="quarter" idx="11"/>
+          </p:nvPr>
+        </p:nvSpPr>
+        <p:spPr/>
+        <p:txBody>
+          <a:bodyPr/>
+          <a:lstStyle/>
+          <a:p>
+            <a:r>
+              <a:rPr lang="en-US" dirty="0"/>
+              <a:t>CONFIDENTIAL – INTERNAL USE ONLY</a:t>
+            </a:r>
+            <a:endParaRPr lang="de-DE" dirty="0"/>
+          </a:p>
+        </p:txBody>
+      </p:sp>
+      <p:sp>
+        <p:nvSpPr>
+          <p:cNvPr id="5" name="Slide Number Placeholder 4">
+            <a:extLst>
+              <a:ext uri="{FF2B5EF4-FFF2-40B4-BE49-F238E27FC236}">
+                <a16:creationId xmlns:a16="http://schemas.microsoft.com/office/drawing/2014/main" id="{69FEF3B3-E8F7-485E-871F-5F7162A30614}"/>
+              </a:ext>
+            </a:extLst>
+          </p:cNvPr>
+          <p:cNvSpPr>
+            <a:spLocks noGrp="1"/>
+          </p:cNvSpPr>
+          <p:nvPr>
+            <p:ph type="sldNum" sz="quarter" idx="12"/>
+          </p:nvPr>
+        </p:nvSpPr>
+        <p:spPr/>
+        <p:txBody>
+          <a:bodyPr/>
+          <a:lstStyle/>
+          <a:p>
+            <a:fld id="{8DE89A3D-C6C4-4521-AE7D-4749D53E6130}" type="slidenum">
+              <a:rPr lang="de-DE" smtClean="0"/>
+              <a:t>‹#›</a:t>
+            </a:fld>
+            <a:endParaRPr lang="de-DE"/>
+          </a:p>
+        </p:txBody>
+      </p:sp>
+      <p:sp>
+        <p:nvSpPr>
+          <p:cNvPr id="7" name="Table Placeholder 6">
+            <a:extLst>
+              <a:ext uri="{FF2B5EF4-FFF2-40B4-BE49-F238E27FC236}">
+                <a16:creationId xmlns:a16="http://schemas.microsoft.com/office/drawing/2014/main" id="{897ED4AD-BA67-4310-81EB-A887513B2C93}"/>
+              </a:ext>
+            </a:extLst>
+          </p:cNvPr>
+          <p:cNvSpPr>
+            <a:spLocks noGrp="1"/>
+          </p:cNvSpPr>
+          <p:nvPr>
+            <p:ph type="tbl" sz="quarter" idx="14"/>
+          </p:nvPr>
+        </p:nvSpPr>
+        <p:spPr>
+          <a:xfrm>
+            <a:off x="407367" y="948810"/>
+            <a:ext cx="11376025" cy="5329436"/>
+          </a:xfrm>
+        </p:spPr>
+        <p:txBody>
+          <a:bodyPr/>
+          <a:lstStyle/>
+          <a:p>
+            <a:endParaRPr lang="en-US"/>
+          </a:p>
+        </p:txBody>
+      </p:sp>
+    </p:spTree>
+    <p:extLst>
+      <p:ext uri="{BB962C8B-B14F-4D97-AF65-F5344CB8AC3E}">
+        <p14:creationId xmlns:p14="http://schemas.microsoft.com/office/powerpoint/2010/main" val="1544370225"/>
+      </p:ext>
+    </p:extLst>
+  </p:cSld>
+  <p:clrMapOvr>
+    <a:masterClrMapping/>
+  </p:clrMapOvr>
+</p:sldLayout>
+</file>
+
+<file path=ppt/slideLayouts/slideLayout14.xml><?xml version="1.0" encoding="utf-8"?>
+<p:sldLayout xmlns:a="http://schemas.openxmlformats.org/drawingml/2006/main" xmlns:r="http://schemas.openxmlformats.org/officeDocument/2006/relationships" xmlns:p="http://schemas.openxmlformats.org/presentationml/2006/main" preserve="1" userDrawn="1">
   <p:cSld name="Leer">
     <p:spTree>
       <p:nvGrpSpPr>
@@ -2892,7 +3331,7 @@
           <a:p>
             <a:fld id="{AEABD364-9D21-46A6-8558-A0B17CB15E93}" type="datetime4">
               <a:rPr lang="en-US" smtClean="0"/>
-              <a:t>November 13, 2022</a:t>
+              <a:t>February 22, 2023</a:t>
             </a:fld>
             <a:endParaRPr lang="de-DE"/>
           </a:p>
@@ -2969,7 +3408,7 @@
 </p:sldLayout>
 </file>
 
-<file path=ppt/slideLayouts/slideLayout13.xml><?xml version="1.0" encoding="utf-8"?>
+<file path=ppt/slideLayouts/slideLayout15.xml><?xml version="1.0" encoding="utf-8"?>
 <p:sldLayout xmlns:a="http://schemas.openxmlformats.org/drawingml/2006/main" xmlns:r="http://schemas.openxmlformats.org/officeDocument/2006/relationships" xmlns:p="http://schemas.openxmlformats.org/presentationml/2006/main" preserve="1" userDrawn="1">
   <p:cSld name="Statement and Text">
     <p:spTree>
@@ -3160,7 +3599,7 @@
           <a:p>
             <a:fld id="{66B439B0-6B12-45B7-BA13-D4A4914AFA58}" type="datetime4">
               <a:rPr lang="en-US" smtClean="0"/>
-              <a:t>November 13, 2022</a:t>
+              <a:t>February 22, 2023</a:t>
             </a:fld>
             <a:endParaRPr lang="de-DE"/>
           </a:p>
@@ -3313,7 +3752,7 @@
 </p:sldLayout>
 </file>
 
-<file path=ppt/slideLayouts/slideLayout14.xml><?xml version="1.0" encoding="utf-8"?>
+<file path=ppt/slideLayouts/slideLayout16.xml><?xml version="1.0" encoding="utf-8"?>
 <p:sldLayout xmlns:a="http://schemas.openxmlformats.org/drawingml/2006/main" xmlns:r="http://schemas.openxmlformats.org/officeDocument/2006/relationships" xmlns:p="http://schemas.openxmlformats.org/presentationml/2006/main" preserve="1" userDrawn="1">
   <p:cSld name="Statement and Image">
     <p:bg>
@@ -3495,7 +3934,7 @@
           <a:p>
             <a:fld id="{EBFA47B6-4EEA-46E9-89F9-3763A0686498}" type="datetime4">
               <a:rPr lang="en-US" smtClean="0"/>
-              <a:t>November 13, 2022</a:t>
+              <a:t>February 22, 2023</a:t>
             </a:fld>
             <a:endParaRPr lang="de-DE" dirty="0"/>
           </a:p>
@@ -3729,7 +4168,7 @@
 </p:sldLayout>
 </file>
 
-<file path=ppt/slideLayouts/slideLayout15.xml><?xml version="1.0" encoding="utf-8"?>
+<file path=ppt/slideLayouts/slideLayout17.xml><?xml version="1.0" encoding="utf-8"?>
 <p:sldLayout xmlns:a="http://schemas.openxmlformats.org/drawingml/2006/main" xmlns:r="http://schemas.openxmlformats.org/officeDocument/2006/relationships" xmlns:p="http://schemas.openxmlformats.org/presentationml/2006/main" preserve="1" userDrawn="1">
   <p:cSld name="Abschnitts-&#10;überschrift">
     <p:spTree>
@@ -4040,7 +4479,7 @@
           <a:p>
             <a:fld id="{4E10FC28-BD7A-4483-897A-936283D2CE5B}" type="datetime4">
               <a:rPr lang="en-US" smtClean="0"/>
-              <a:t>November 13, 2022</a:t>
+              <a:t>February 22, 2023</a:t>
             </a:fld>
             <a:endParaRPr lang="de-DE"/>
           </a:p>
@@ -4117,7 +4556,7 @@
 </p:sldLayout>
 </file>
 
-<file path=ppt/slideLayouts/slideLayout16.xml><?xml version="1.0" encoding="utf-8"?>
+<file path=ppt/slideLayouts/slideLayout18.xml><?xml version="1.0" encoding="utf-8"?>
 <p:sldLayout xmlns:a="http://schemas.openxmlformats.org/drawingml/2006/main" xmlns:r="http://schemas.openxmlformats.org/officeDocument/2006/relationships" xmlns:p="http://schemas.openxmlformats.org/presentationml/2006/main" preserve="1" userDrawn="1">
   <p:cSld name="Section Header – Dots">
     <p:spTree>
@@ -19822,7 +20261,7 @@
           <a:p>
             <a:fld id="{3F2707FC-CB14-4199-99D5-E6E98A6B98E8}" type="datetime4">
               <a:rPr lang="en-US" smtClean="0"/>
-              <a:t>November 13, 2022</a:t>
+              <a:t>February 22, 2023</a:t>
             </a:fld>
             <a:endParaRPr lang="de-DE"/>
           </a:p>
@@ -19899,7 +20338,7 @@
 </p:sldLayout>
 </file>
 
-<file path=ppt/slideLayouts/slideLayout17.xml><?xml version="1.0" encoding="utf-8"?>
+<file path=ppt/slideLayouts/slideLayout19.xml><?xml version="1.0" encoding="utf-8"?>
 <p:sldLayout xmlns:a="http://schemas.openxmlformats.org/drawingml/2006/main" xmlns:r="http://schemas.openxmlformats.org/officeDocument/2006/relationships" xmlns:p="http://schemas.openxmlformats.org/presentationml/2006/main" preserve="1" userDrawn="1">
   <p:cSld name="Section Header – Image">
     <p:spTree>
@@ -20025,7 +20464,7 @@
           <a:p>
             <a:fld id="{EF31B3D3-E984-4123-ACFA-99EB009E1618}" type="datetime4">
               <a:rPr lang="en-US" smtClean="0"/>
-              <a:t>November 13, 2022</a:t>
+              <a:t>February 22, 2023</a:t>
             </a:fld>
             <a:endParaRPr lang="de-DE"/>
           </a:p>
@@ -20102,7 +20541,359 @@
 </p:sldLayout>
 </file>
 
-<file path=ppt/slideLayouts/slideLayout18.xml><?xml version="1.0" encoding="utf-8"?>
+<file path=ppt/slideLayouts/slideLayout2.xml><?xml version="1.0" encoding="utf-8"?>
+<p:sldLayout xmlns:a="http://schemas.openxmlformats.org/drawingml/2006/main" xmlns:r="http://schemas.openxmlformats.org/officeDocument/2006/relationships" xmlns:p="http://schemas.openxmlformats.org/presentationml/2006/main" preserve="1" userDrawn="1">
+  <p:cSld name="Titel und Inhalt">
+    <p:spTree>
+      <p:nvGrpSpPr>
+        <p:cNvPr id="1" name=""/>
+        <p:cNvGrpSpPr/>
+        <p:nvPr/>
+      </p:nvGrpSpPr>
+      <p:grpSpPr>
+        <a:xfrm>
+          <a:off x="0" y="0"/>
+          <a:ext cx="0" cy="0"/>
+          <a:chOff x="0" y="0"/>
+          <a:chExt cx="0" cy="0"/>
+        </a:xfrm>
+      </p:grpSpPr>
+      <p:sp>
+        <p:nvSpPr>
+          <p:cNvPr id="2" name="Title 1">
+            <a:extLst>
+              <a:ext uri="{FF2B5EF4-FFF2-40B4-BE49-F238E27FC236}">
+                <a16:creationId xmlns:a16="http://schemas.microsoft.com/office/drawing/2014/main" id="{5FAFFEE5-9120-4D79-8C72-BB3DC15837BE}"/>
+              </a:ext>
+            </a:extLst>
+          </p:cNvPr>
+          <p:cNvSpPr>
+            <a:spLocks noGrp="1"/>
+          </p:cNvSpPr>
+          <p:nvPr>
+            <p:ph type="title"/>
+          </p:nvPr>
+        </p:nvSpPr>
+        <p:spPr/>
+        <p:txBody>
+          <a:bodyPr/>
+          <a:lstStyle/>
+          <a:p>
+            <a:r>
+              <a:rPr lang="de-DE"/>
+              <a:t>Mastertitelformat bearbeiten</a:t>
+            </a:r>
+            <a:endParaRPr lang="de-DE" dirty="0"/>
+          </a:p>
+        </p:txBody>
+      </p:sp>
+      <p:sp>
+        <p:nvSpPr>
+          <p:cNvPr id="3" name="Content Placeholder 2">
+            <a:extLst>
+              <a:ext uri="{FF2B5EF4-FFF2-40B4-BE49-F238E27FC236}">
+                <a16:creationId xmlns:a16="http://schemas.microsoft.com/office/drawing/2014/main" id="{5D931949-6115-4509-B01B-72C482004D79}"/>
+              </a:ext>
+            </a:extLst>
+          </p:cNvPr>
+          <p:cNvSpPr>
+            <a:spLocks noGrp="1"/>
+          </p:cNvSpPr>
+          <p:nvPr>
+            <p:ph idx="1"/>
+          </p:nvPr>
+        </p:nvSpPr>
+        <p:spPr/>
+        <p:txBody>
+          <a:bodyPr/>
+          <a:lstStyle/>
+          <a:p>
+            <a:pPr lvl="0"/>
+            <a:r>
+              <a:rPr lang="de-DE"/>
+              <a:t>Mastertextformat bearbeiten</a:t>
+            </a:r>
+          </a:p>
+          <a:p>
+            <a:pPr lvl="1"/>
+            <a:r>
+              <a:rPr lang="de-DE"/>
+              <a:t>Zweite Ebene</a:t>
+            </a:r>
+          </a:p>
+          <a:p>
+            <a:pPr lvl="2"/>
+            <a:r>
+              <a:rPr lang="de-DE"/>
+              <a:t>Dritte Ebene</a:t>
+            </a:r>
+          </a:p>
+          <a:p>
+            <a:pPr lvl="3"/>
+            <a:r>
+              <a:rPr lang="de-DE"/>
+              <a:t>Vierte Ebene</a:t>
+            </a:r>
+          </a:p>
+          <a:p>
+            <a:pPr lvl="4"/>
+            <a:r>
+              <a:rPr lang="de-DE"/>
+              <a:t>Fünfte Ebene</a:t>
+            </a:r>
+            <a:endParaRPr lang="de-DE" dirty="0"/>
+          </a:p>
+        </p:txBody>
+      </p:sp>
+      <p:sp>
+        <p:nvSpPr>
+          <p:cNvPr id="4" name="Date Placeholder 3">
+            <a:extLst>
+              <a:ext uri="{FF2B5EF4-FFF2-40B4-BE49-F238E27FC236}">
+                <a16:creationId xmlns:a16="http://schemas.microsoft.com/office/drawing/2014/main" id="{20FFD4C7-DFEA-4556-B404-44311FB813EB}"/>
+              </a:ext>
+            </a:extLst>
+          </p:cNvPr>
+          <p:cNvSpPr>
+            <a:spLocks noGrp="1"/>
+          </p:cNvSpPr>
+          <p:nvPr>
+            <p:ph type="dt" sz="half" idx="10"/>
+          </p:nvPr>
+        </p:nvSpPr>
+        <p:spPr/>
+        <p:txBody>
+          <a:bodyPr/>
+          <a:lstStyle/>
+          <a:p>
+            <a:fld id="{6ADB5DE5-ED93-4FBD-ABEB-886FC497F9CD}" type="datetime4">
+              <a:rPr lang="en-US" smtClean="0"/>
+              <a:t>February 22, 2023</a:t>
+            </a:fld>
+            <a:endParaRPr lang="de-DE"/>
+          </a:p>
+        </p:txBody>
+      </p:sp>
+      <p:sp>
+        <p:nvSpPr>
+          <p:cNvPr id="5" name="Footer Placeholder 4">
+            <a:extLst>
+              <a:ext uri="{FF2B5EF4-FFF2-40B4-BE49-F238E27FC236}">
+                <a16:creationId xmlns:a16="http://schemas.microsoft.com/office/drawing/2014/main" id="{0B96DD30-0AD0-4901-AF50-6F9190E551E8}"/>
+              </a:ext>
+            </a:extLst>
+          </p:cNvPr>
+          <p:cNvSpPr>
+            <a:spLocks noGrp="1"/>
+          </p:cNvSpPr>
+          <p:nvPr>
+            <p:ph type="ftr" sz="quarter" idx="11"/>
+          </p:nvPr>
+        </p:nvSpPr>
+        <p:spPr/>
+        <p:txBody>
+          <a:bodyPr/>
+          <a:lstStyle/>
+          <a:p>
+            <a:r>
+              <a:rPr lang="en-US" dirty="0"/>
+              <a:t>CONFIDENTIAL – INTERNAL USE ONLY</a:t>
+            </a:r>
+            <a:endParaRPr lang="de-DE" dirty="0"/>
+          </a:p>
+        </p:txBody>
+      </p:sp>
+      <p:sp>
+        <p:nvSpPr>
+          <p:cNvPr id="6" name="Slide Number Placeholder 5">
+            <a:extLst>
+              <a:ext uri="{FF2B5EF4-FFF2-40B4-BE49-F238E27FC236}">
+                <a16:creationId xmlns:a16="http://schemas.microsoft.com/office/drawing/2014/main" id="{F678B330-D853-46EE-912A-9025FC1F131C}"/>
+              </a:ext>
+            </a:extLst>
+          </p:cNvPr>
+          <p:cNvSpPr>
+            <a:spLocks noGrp="1"/>
+          </p:cNvSpPr>
+          <p:nvPr>
+            <p:ph type="sldNum" sz="quarter" idx="12"/>
+          </p:nvPr>
+        </p:nvSpPr>
+        <p:spPr/>
+        <p:txBody>
+          <a:bodyPr/>
+          <a:lstStyle/>
+          <a:p>
+            <a:fld id="{8DE89A3D-C6C4-4521-AE7D-4749D53E6130}" type="slidenum">
+              <a:rPr lang="de-DE" smtClean="0"/>
+              <a:t>‹#›</a:t>
+            </a:fld>
+            <a:endParaRPr lang="de-DE"/>
+          </a:p>
+        </p:txBody>
+      </p:sp>
+      <p:sp>
+        <p:nvSpPr>
+          <p:cNvPr id="7" name="Text Placeholder 21">
+            <a:extLst>
+              <a:ext uri="{FF2B5EF4-FFF2-40B4-BE49-F238E27FC236}">
+                <a16:creationId xmlns:a16="http://schemas.microsoft.com/office/drawing/2014/main" id="{833CF7A9-B9A8-48A1-9A63-0944A0D4E3E0}"/>
+              </a:ext>
+            </a:extLst>
+          </p:cNvPr>
+          <p:cNvSpPr>
+            <a:spLocks noGrp="1"/>
+          </p:cNvSpPr>
+          <p:nvPr>
+            <p:ph type="body" sz="quarter" idx="22"/>
+          </p:nvPr>
+        </p:nvSpPr>
+        <p:spPr>
+          <a:xfrm>
+            <a:off x="407988" y="6021388"/>
+            <a:ext cx="11376025" cy="215900"/>
+          </a:xfrm>
+        </p:spPr>
+        <p:txBody>
+          <a:bodyPr anchor="b" anchorCtr="0"/>
+          <a:lstStyle>
+            <a:lvl1pPr marL="0" indent="0">
+              <a:spcBef>
+                <a:spcPts val="0"/>
+              </a:spcBef>
+              <a:buFont typeface="Arial" panose="020B0604020202020204" pitchFamily="34" charset="0"/>
+              <a:buNone/>
+              <a:defRPr sz="1000">
+                <a:solidFill>
+                  <a:schemeClr val="tx1"/>
+                </a:solidFill>
+                <a:latin typeface="+mn-lt"/>
+              </a:defRPr>
+            </a:lvl1pPr>
+            <a:lvl2pPr marL="0" indent="0">
+              <a:spcBef>
+                <a:spcPts val="0"/>
+              </a:spcBef>
+              <a:buFont typeface="Arial" panose="020B0604020202020204" pitchFamily="34" charset="0"/>
+              <a:buNone/>
+              <a:defRPr sz="1000">
+                <a:solidFill>
+                  <a:schemeClr val="tx1"/>
+                </a:solidFill>
+                <a:latin typeface="+mn-lt"/>
+              </a:defRPr>
+            </a:lvl2pPr>
+            <a:lvl3pPr marL="0" indent="0">
+              <a:spcBef>
+                <a:spcPts val="0"/>
+              </a:spcBef>
+              <a:buNone/>
+              <a:defRPr sz="1000">
+                <a:solidFill>
+                  <a:schemeClr val="tx1"/>
+                </a:solidFill>
+                <a:latin typeface="+mn-lt"/>
+              </a:defRPr>
+            </a:lvl3pPr>
+            <a:lvl4pPr marL="0" indent="0">
+              <a:spcBef>
+                <a:spcPts val="0"/>
+              </a:spcBef>
+              <a:buNone/>
+              <a:defRPr sz="1000">
+                <a:solidFill>
+                  <a:schemeClr val="tx1"/>
+                </a:solidFill>
+                <a:latin typeface="+mn-lt"/>
+              </a:defRPr>
+            </a:lvl4pPr>
+            <a:lvl5pPr marL="0" indent="0">
+              <a:spcBef>
+                <a:spcPts val="0"/>
+              </a:spcBef>
+              <a:buNone/>
+              <a:defRPr sz="1000">
+                <a:solidFill>
+                  <a:schemeClr val="tx1"/>
+                </a:solidFill>
+                <a:latin typeface="+mn-lt"/>
+              </a:defRPr>
+            </a:lvl5pPr>
+            <a:lvl6pPr marL="0" indent="0">
+              <a:spcBef>
+                <a:spcPts val="0"/>
+              </a:spcBef>
+              <a:buFont typeface="Arial" panose="020B0604020202020204" pitchFamily="34" charset="0"/>
+              <a:buNone/>
+              <a:defRPr sz="1000">
+                <a:solidFill>
+                  <a:schemeClr val="tx1"/>
+                </a:solidFill>
+                <a:latin typeface="+mn-lt"/>
+              </a:defRPr>
+            </a:lvl6pPr>
+            <a:lvl7pPr marL="0" indent="0">
+              <a:spcBef>
+                <a:spcPts val="0"/>
+              </a:spcBef>
+              <a:buFont typeface="Arial" panose="020B0604020202020204" pitchFamily="34" charset="0"/>
+              <a:buNone/>
+              <a:defRPr sz="1000">
+                <a:solidFill>
+                  <a:schemeClr val="tx1"/>
+                </a:solidFill>
+                <a:latin typeface="+mn-lt"/>
+              </a:defRPr>
+            </a:lvl7pPr>
+            <a:lvl8pPr marL="0" indent="0">
+              <a:spcBef>
+                <a:spcPts val="0"/>
+              </a:spcBef>
+              <a:buNone/>
+              <a:defRPr sz="1000">
+                <a:solidFill>
+                  <a:schemeClr val="tx1"/>
+                </a:solidFill>
+                <a:latin typeface="+mn-lt"/>
+              </a:defRPr>
+            </a:lvl8pPr>
+            <a:lvl9pPr marL="0" indent="0">
+              <a:spcBef>
+                <a:spcPts val="0"/>
+              </a:spcBef>
+              <a:buFont typeface="Arial" panose="020B0604020202020204" pitchFamily="34" charset="0"/>
+              <a:buNone/>
+              <a:defRPr sz="1000">
+                <a:solidFill>
+                  <a:schemeClr val="tx1"/>
+                </a:solidFill>
+                <a:latin typeface="+mn-lt"/>
+              </a:defRPr>
+            </a:lvl9pPr>
+          </a:lstStyle>
+          <a:p>
+            <a:pPr lvl="0"/>
+            <a:r>
+              <a:rPr lang="de-DE"/>
+              <a:t>Mastertextformat bearbeiten</a:t>
+            </a:r>
+          </a:p>
+        </p:txBody>
+      </p:sp>
+    </p:spTree>
+    <p:extLst>
+      <p:ext uri="{BB962C8B-B14F-4D97-AF65-F5344CB8AC3E}">
+        <p14:creationId xmlns:p14="http://schemas.microsoft.com/office/powerpoint/2010/main" val="592552878"/>
+      </p:ext>
+    </p:extLst>
+  </p:cSld>
+  <p:clrMapOvr>
+    <a:masterClrMapping/>
+  </p:clrMapOvr>
+</p:sldLayout>
+</file>
+
+<file path=ppt/slideLayouts/slideLayout20.xml><?xml version="1.0" encoding="utf-8"?>
 <p:sldLayout xmlns:a="http://schemas.openxmlformats.org/drawingml/2006/main" xmlns:r="http://schemas.openxmlformats.org/officeDocument/2006/relationships" xmlns:p="http://schemas.openxmlformats.org/presentationml/2006/main" preserve="1" userDrawn="1">
   <p:cSld name="Section Header – Dark Blue">
     <p:bg>
@@ -20147,7 +20938,7 @@
           <a:p>
             <a:fld id="{63F36FD1-AD41-4708-BC05-945A216E8735}" type="datetime4">
               <a:rPr lang="en-US" smtClean="0"/>
-              <a:t>November 13, 2022</a:t>
+              <a:t>February 22, 2023</a:t>
             </a:fld>
             <a:endParaRPr lang="de-DE"/>
           </a:p>
@@ -20435,7 +21226,7 @@
 </p:sldLayout>
 </file>
 
-<file path=ppt/slideLayouts/slideLayout19.xml><?xml version="1.0" encoding="utf-8"?>
+<file path=ppt/slideLayouts/slideLayout21.xml><?xml version="1.0" encoding="utf-8"?>
 <p:sldLayout xmlns:a="http://schemas.openxmlformats.org/drawingml/2006/main" xmlns:r="http://schemas.openxmlformats.org/officeDocument/2006/relationships" xmlns:p="http://schemas.openxmlformats.org/presentationml/2006/main" preserve="1" userDrawn="1">
   <p:cSld name="Agenda">
     <p:spTree>
@@ -20504,7 +21295,7 @@
           <a:p>
             <a:fld id="{F57DB616-4CFF-4D0B-AEF5-72635AC81B81}" type="datetime4">
               <a:rPr lang="en-US" smtClean="0"/>
-              <a:t>November 13, 2022</a:t>
+              <a:t>February 22, 2023</a:t>
             </a:fld>
             <a:endParaRPr lang="de-DE"/>
           </a:p>
@@ -20836,359 +21627,7 @@
 </p:sldLayout>
 </file>
 
-<file path=ppt/slideLayouts/slideLayout2.xml><?xml version="1.0" encoding="utf-8"?>
-<p:sldLayout xmlns:a="http://schemas.openxmlformats.org/drawingml/2006/main" xmlns:r="http://schemas.openxmlformats.org/officeDocument/2006/relationships" xmlns:p="http://schemas.openxmlformats.org/presentationml/2006/main" preserve="1" userDrawn="1">
-  <p:cSld name="Titel und Inhalt">
-    <p:spTree>
-      <p:nvGrpSpPr>
-        <p:cNvPr id="1" name=""/>
-        <p:cNvGrpSpPr/>
-        <p:nvPr/>
-      </p:nvGrpSpPr>
-      <p:grpSpPr>
-        <a:xfrm>
-          <a:off x="0" y="0"/>
-          <a:ext cx="0" cy="0"/>
-          <a:chOff x="0" y="0"/>
-          <a:chExt cx="0" cy="0"/>
-        </a:xfrm>
-      </p:grpSpPr>
-      <p:sp>
-        <p:nvSpPr>
-          <p:cNvPr id="2" name="Title 1">
-            <a:extLst>
-              <a:ext uri="{FF2B5EF4-FFF2-40B4-BE49-F238E27FC236}">
-                <a16:creationId xmlns:a16="http://schemas.microsoft.com/office/drawing/2014/main" id="{5FAFFEE5-9120-4D79-8C72-BB3DC15837BE}"/>
-              </a:ext>
-            </a:extLst>
-          </p:cNvPr>
-          <p:cNvSpPr>
-            <a:spLocks noGrp="1"/>
-          </p:cNvSpPr>
-          <p:nvPr>
-            <p:ph type="title"/>
-          </p:nvPr>
-        </p:nvSpPr>
-        <p:spPr/>
-        <p:txBody>
-          <a:bodyPr/>
-          <a:lstStyle/>
-          <a:p>
-            <a:r>
-              <a:rPr lang="de-DE"/>
-              <a:t>Mastertitelformat bearbeiten</a:t>
-            </a:r>
-            <a:endParaRPr lang="de-DE" dirty="0"/>
-          </a:p>
-        </p:txBody>
-      </p:sp>
-      <p:sp>
-        <p:nvSpPr>
-          <p:cNvPr id="3" name="Content Placeholder 2">
-            <a:extLst>
-              <a:ext uri="{FF2B5EF4-FFF2-40B4-BE49-F238E27FC236}">
-                <a16:creationId xmlns:a16="http://schemas.microsoft.com/office/drawing/2014/main" id="{5D931949-6115-4509-B01B-72C482004D79}"/>
-              </a:ext>
-            </a:extLst>
-          </p:cNvPr>
-          <p:cNvSpPr>
-            <a:spLocks noGrp="1"/>
-          </p:cNvSpPr>
-          <p:nvPr>
-            <p:ph idx="1"/>
-          </p:nvPr>
-        </p:nvSpPr>
-        <p:spPr/>
-        <p:txBody>
-          <a:bodyPr/>
-          <a:lstStyle/>
-          <a:p>
-            <a:pPr lvl="0"/>
-            <a:r>
-              <a:rPr lang="de-DE"/>
-              <a:t>Mastertextformat bearbeiten</a:t>
-            </a:r>
-          </a:p>
-          <a:p>
-            <a:pPr lvl="1"/>
-            <a:r>
-              <a:rPr lang="de-DE"/>
-              <a:t>Zweite Ebene</a:t>
-            </a:r>
-          </a:p>
-          <a:p>
-            <a:pPr lvl="2"/>
-            <a:r>
-              <a:rPr lang="de-DE"/>
-              <a:t>Dritte Ebene</a:t>
-            </a:r>
-          </a:p>
-          <a:p>
-            <a:pPr lvl="3"/>
-            <a:r>
-              <a:rPr lang="de-DE"/>
-              <a:t>Vierte Ebene</a:t>
-            </a:r>
-          </a:p>
-          <a:p>
-            <a:pPr lvl="4"/>
-            <a:r>
-              <a:rPr lang="de-DE"/>
-              <a:t>Fünfte Ebene</a:t>
-            </a:r>
-            <a:endParaRPr lang="de-DE" dirty="0"/>
-          </a:p>
-        </p:txBody>
-      </p:sp>
-      <p:sp>
-        <p:nvSpPr>
-          <p:cNvPr id="4" name="Date Placeholder 3">
-            <a:extLst>
-              <a:ext uri="{FF2B5EF4-FFF2-40B4-BE49-F238E27FC236}">
-                <a16:creationId xmlns:a16="http://schemas.microsoft.com/office/drawing/2014/main" id="{20FFD4C7-DFEA-4556-B404-44311FB813EB}"/>
-              </a:ext>
-            </a:extLst>
-          </p:cNvPr>
-          <p:cNvSpPr>
-            <a:spLocks noGrp="1"/>
-          </p:cNvSpPr>
-          <p:nvPr>
-            <p:ph type="dt" sz="half" idx="10"/>
-          </p:nvPr>
-        </p:nvSpPr>
-        <p:spPr/>
-        <p:txBody>
-          <a:bodyPr/>
-          <a:lstStyle/>
-          <a:p>
-            <a:fld id="{6ADB5DE5-ED93-4FBD-ABEB-886FC497F9CD}" type="datetime4">
-              <a:rPr lang="en-US" smtClean="0"/>
-              <a:t>November 13, 2022</a:t>
-            </a:fld>
-            <a:endParaRPr lang="de-DE"/>
-          </a:p>
-        </p:txBody>
-      </p:sp>
-      <p:sp>
-        <p:nvSpPr>
-          <p:cNvPr id="5" name="Footer Placeholder 4">
-            <a:extLst>
-              <a:ext uri="{FF2B5EF4-FFF2-40B4-BE49-F238E27FC236}">
-                <a16:creationId xmlns:a16="http://schemas.microsoft.com/office/drawing/2014/main" id="{0B96DD30-0AD0-4901-AF50-6F9190E551E8}"/>
-              </a:ext>
-            </a:extLst>
-          </p:cNvPr>
-          <p:cNvSpPr>
-            <a:spLocks noGrp="1"/>
-          </p:cNvSpPr>
-          <p:nvPr>
-            <p:ph type="ftr" sz="quarter" idx="11"/>
-          </p:nvPr>
-        </p:nvSpPr>
-        <p:spPr/>
-        <p:txBody>
-          <a:bodyPr/>
-          <a:lstStyle/>
-          <a:p>
-            <a:r>
-              <a:rPr lang="en-US" dirty="0"/>
-              <a:t>CONFIDENTIAL – INTERNAL USE ONLY</a:t>
-            </a:r>
-            <a:endParaRPr lang="de-DE" dirty="0"/>
-          </a:p>
-        </p:txBody>
-      </p:sp>
-      <p:sp>
-        <p:nvSpPr>
-          <p:cNvPr id="6" name="Slide Number Placeholder 5">
-            <a:extLst>
-              <a:ext uri="{FF2B5EF4-FFF2-40B4-BE49-F238E27FC236}">
-                <a16:creationId xmlns:a16="http://schemas.microsoft.com/office/drawing/2014/main" id="{F678B330-D853-46EE-912A-9025FC1F131C}"/>
-              </a:ext>
-            </a:extLst>
-          </p:cNvPr>
-          <p:cNvSpPr>
-            <a:spLocks noGrp="1"/>
-          </p:cNvSpPr>
-          <p:nvPr>
-            <p:ph type="sldNum" sz="quarter" idx="12"/>
-          </p:nvPr>
-        </p:nvSpPr>
-        <p:spPr/>
-        <p:txBody>
-          <a:bodyPr/>
-          <a:lstStyle/>
-          <a:p>
-            <a:fld id="{8DE89A3D-C6C4-4521-AE7D-4749D53E6130}" type="slidenum">
-              <a:rPr lang="de-DE" smtClean="0"/>
-              <a:t>‹#›</a:t>
-            </a:fld>
-            <a:endParaRPr lang="de-DE"/>
-          </a:p>
-        </p:txBody>
-      </p:sp>
-      <p:sp>
-        <p:nvSpPr>
-          <p:cNvPr id="7" name="Text Placeholder 21">
-            <a:extLst>
-              <a:ext uri="{FF2B5EF4-FFF2-40B4-BE49-F238E27FC236}">
-                <a16:creationId xmlns:a16="http://schemas.microsoft.com/office/drawing/2014/main" id="{833CF7A9-B9A8-48A1-9A63-0944A0D4E3E0}"/>
-              </a:ext>
-            </a:extLst>
-          </p:cNvPr>
-          <p:cNvSpPr>
-            <a:spLocks noGrp="1"/>
-          </p:cNvSpPr>
-          <p:nvPr>
-            <p:ph type="body" sz="quarter" idx="22"/>
-          </p:nvPr>
-        </p:nvSpPr>
-        <p:spPr>
-          <a:xfrm>
-            <a:off x="407988" y="6021388"/>
-            <a:ext cx="11376025" cy="215900"/>
-          </a:xfrm>
-        </p:spPr>
-        <p:txBody>
-          <a:bodyPr anchor="b" anchorCtr="0"/>
-          <a:lstStyle>
-            <a:lvl1pPr marL="0" indent="0">
-              <a:spcBef>
-                <a:spcPts val="0"/>
-              </a:spcBef>
-              <a:buFont typeface="Arial" panose="020B0604020202020204" pitchFamily="34" charset="0"/>
-              <a:buNone/>
-              <a:defRPr sz="1000">
-                <a:solidFill>
-                  <a:schemeClr val="tx1"/>
-                </a:solidFill>
-                <a:latin typeface="+mn-lt"/>
-              </a:defRPr>
-            </a:lvl1pPr>
-            <a:lvl2pPr marL="0" indent="0">
-              <a:spcBef>
-                <a:spcPts val="0"/>
-              </a:spcBef>
-              <a:buFont typeface="Arial" panose="020B0604020202020204" pitchFamily="34" charset="0"/>
-              <a:buNone/>
-              <a:defRPr sz="1000">
-                <a:solidFill>
-                  <a:schemeClr val="tx1"/>
-                </a:solidFill>
-                <a:latin typeface="+mn-lt"/>
-              </a:defRPr>
-            </a:lvl2pPr>
-            <a:lvl3pPr marL="0" indent="0">
-              <a:spcBef>
-                <a:spcPts val="0"/>
-              </a:spcBef>
-              <a:buNone/>
-              <a:defRPr sz="1000">
-                <a:solidFill>
-                  <a:schemeClr val="tx1"/>
-                </a:solidFill>
-                <a:latin typeface="+mn-lt"/>
-              </a:defRPr>
-            </a:lvl3pPr>
-            <a:lvl4pPr marL="0" indent="0">
-              <a:spcBef>
-                <a:spcPts val="0"/>
-              </a:spcBef>
-              <a:buNone/>
-              <a:defRPr sz="1000">
-                <a:solidFill>
-                  <a:schemeClr val="tx1"/>
-                </a:solidFill>
-                <a:latin typeface="+mn-lt"/>
-              </a:defRPr>
-            </a:lvl4pPr>
-            <a:lvl5pPr marL="0" indent="0">
-              <a:spcBef>
-                <a:spcPts val="0"/>
-              </a:spcBef>
-              <a:buNone/>
-              <a:defRPr sz="1000">
-                <a:solidFill>
-                  <a:schemeClr val="tx1"/>
-                </a:solidFill>
-                <a:latin typeface="+mn-lt"/>
-              </a:defRPr>
-            </a:lvl5pPr>
-            <a:lvl6pPr marL="0" indent="0">
-              <a:spcBef>
-                <a:spcPts val="0"/>
-              </a:spcBef>
-              <a:buFont typeface="Arial" panose="020B0604020202020204" pitchFamily="34" charset="0"/>
-              <a:buNone/>
-              <a:defRPr sz="1000">
-                <a:solidFill>
-                  <a:schemeClr val="tx1"/>
-                </a:solidFill>
-                <a:latin typeface="+mn-lt"/>
-              </a:defRPr>
-            </a:lvl6pPr>
-            <a:lvl7pPr marL="0" indent="0">
-              <a:spcBef>
-                <a:spcPts val="0"/>
-              </a:spcBef>
-              <a:buFont typeface="Arial" panose="020B0604020202020204" pitchFamily="34" charset="0"/>
-              <a:buNone/>
-              <a:defRPr sz="1000">
-                <a:solidFill>
-                  <a:schemeClr val="tx1"/>
-                </a:solidFill>
-                <a:latin typeface="+mn-lt"/>
-              </a:defRPr>
-            </a:lvl7pPr>
-            <a:lvl8pPr marL="0" indent="0">
-              <a:spcBef>
-                <a:spcPts val="0"/>
-              </a:spcBef>
-              <a:buNone/>
-              <a:defRPr sz="1000">
-                <a:solidFill>
-                  <a:schemeClr val="tx1"/>
-                </a:solidFill>
-                <a:latin typeface="+mn-lt"/>
-              </a:defRPr>
-            </a:lvl8pPr>
-            <a:lvl9pPr marL="0" indent="0">
-              <a:spcBef>
-                <a:spcPts val="0"/>
-              </a:spcBef>
-              <a:buFont typeface="Arial" panose="020B0604020202020204" pitchFamily="34" charset="0"/>
-              <a:buNone/>
-              <a:defRPr sz="1000">
-                <a:solidFill>
-                  <a:schemeClr val="tx1"/>
-                </a:solidFill>
-                <a:latin typeface="+mn-lt"/>
-              </a:defRPr>
-            </a:lvl9pPr>
-          </a:lstStyle>
-          <a:p>
-            <a:pPr lvl="0"/>
-            <a:r>
-              <a:rPr lang="de-DE"/>
-              <a:t>Mastertextformat bearbeiten</a:t>
-            </a:r>
-          </a:p>
-        </p:txBody>
-      </p:sp>
-    </p:spTree>
-    <p:extLst>
-      <p:ext uri="{BB962C8B-B14F-4D97-AF65-F5344CB8AC3E}">
-        <p14:creationId xmlns:p14="http://schemas.microsoft.com/office/powerpoint/2010/main" val="592552878"/>
-      </p:ext>
-    </p:extLst>
-  </p:cSld>
-  <p:clrMapOvr>
-    <a:masterClrMapping/>
-  </p:clrMapOvr>
-</p:sldLayout>
-</file>
-
-<file path=ppt/slideLayouts/slideLayout20.xml><?xml version="1.0" encoding="utf-8"?>
+<file path=ppt/slideLayouts/slideLayout22.xml><?xml version="1.0" encoding="utf-8"?>
 <p:sldLayout xmlns:a="http://schemas.openxmlformats.org/drawingml/2006/main" xmlns:r="http://schemas.openxmlformats.org/officeDocument/2006/relationships" xmlns:p="http://schemas.openxmlformats.org/presentationml/2006/main" showMasterSp="0" preserve="1" userDrawn="1">
   <p:cSld name="Title Slide – Dots">
     <p:spTree>
@@ -37403,7 +37842,7 @@
 </p:sldLayout>
 </file>
 
-<file path=ppt/slideLayouts/slideLayout21.xml><?xml version="1.0" encoding="utf-8"?>
+<file path=ppt/slideLayouts/slideLayout23.xml><?xml version="1.0" encoding="utf-8"?>
 <p:sldLayout xmlns:a="http://schemas.openxmlformats.org/drawingml/2006/main" xmlns:r="http://schemas.openxmlformats.org/officeDocument/2006/relationships" xmlns:p="http://schemas.openxmlformats.org/presentationml/2006/main" showMasterSp="0" preserve="1" userDrawn="1">
   <p:cSld name="Title Slide – Image">
     <p:bg>
@@ -38136,7 +38575,7 @@
 </p:sldLayout>
 </file>
 
-<file path=ppt/slideLayouts/slideLayout22.xml><?xml version="1.0" encoding="utf-8"?>
+<file path=ppt/slideLayouts/slideLayout24.xml><?xml version="1.0" encoding="utf-8"?>
 <p:sldLayout xmlns:a="http://schemas.openxmlformats.org/drawingml/2006/main" xmlns:r="http://schemas.openxmlformats.org/officeDocument/2006/relationships" xmlns:p="http://schemas.openxmlformats.org/presentationml/2006/main" showMasterSp="0" preserve="1" userDrawn="1">
   <p:cSld name="Closing Slide">
     <p:bg>
@@ -38490,7 +38929,7 @@
 </p:sldLayout>
 </file>
 
-<file path=ppt/slideLayouts/slideLayout23.xml><?xml version="1.0" encoding="utf-8"?>
+<file path=ppt/slideLayouts/slideLayout25.xml><?xml version="1.0" encoding="utf-8"?>
 <p:sldLayout xmlns:a="http://schemas.openxmlformats.org/drawingml/2006/main" xmlns:r="http://schemas.openxmlformats.org/officeDocument/2006/relationships" xmlns:p="http://schemas.openxmlformats.org/presentationml/2006/main" showMasterSp="0" preserve="1" userDrawn="1">
   <p:cSld name="Disclaimer">
     <p:spTree>
@@ -38993,7 +39432,7 @@
 </p:sldLayout>
 </file>
 
-<file path=ppt/slideLayouts/slideLayout24.xml><?xml version="1.0" encoding="utf-8"?>
+<file path=ppt/slideLayouts/slideLayout26.xml><?xml version="1.0" encoding="utf-8"?>
 <p:sldLayout xmlns:a="http://schemas.openxmlformats.org/drawingml/2006/main" xmlns:r="http://schemas.openxmlformats.org/officeDocument/2006/relationships" xmlns:p="http://schemas.openxmlformats.org/presentationml/2006/main" showMasterSp="0" preserve="1" userDrawn="1">
   <p:cSld name="Disclaimer – Dark Blue">
     <p:bg>
@@ -39501,7 +39940,7 @@
 </p:sldLayout>
 </file>
 
-<file path=ppt/slideLayouts/slideLayout25.xml><?xml version="1.0" encoding="utf-8"?>
+<file path=ppt/slideLayouts/slideLayout27.xml><?xml version="1.0" encoding="utf-8"?>
 <p:sldLayout xmlns:a="http://schemas.openxmlformats.org/drawingml/2006/main" xmlns:r="http://schemas.openxmlformats.org/officeDocument/2006/relationships" xmlns:p="http://schemas.openxmlformats.org/presentationml/2006/main" showMasterSp="0" preserve="1" userDrawn="1">
   <p:cSld name="Eyecatcher Backup">
     <p:spTree>
@@ -39801,7 +40240,7 @@
           <a:p>
             <a:fld id="{7AC2745F-CC38-4C8E-ABA1-9E0765028C3F}" type="datetime4">
               <a:rPr lang="en-US" smtClean="0"/>
-              <a:t>November 13, 2022</a:t>
+              <a:t>February 22, 2023</a:t>
             </a:fld>
             <a:endParaRPr lang="de-DE"/>
           </a:p>
@@ -40433,7 +40872,7 @@
           <a:p>
             <a:fld id="{108F5090-2ED9-45B3-AF5C-3405703B037F}" type="datetime4">
               <a:rPr lang="en-US" smtClean="0"/>
-              <a:t>November 13, 2022</a:t>
+              <a:t>February 22, 2023</a:t>
             </a:fld>
             <a:endParaRPr lang="de-DE"/>
           </a:p>
@@ -40879,7 +41318,7 @@
           <a:p>
             <a:fld id="{FBF80186-DF4E-457C-9C04-2C606FD0AA66}" type="datetime4">
               <a:rPr lang="en-US" smtClean="0"/>
-              <a:t>November 13, 2022</a:t>
+              <a:t>February 22, 2023</a:t>
             </a:fld>
             <a:endParaRPr lang="de-DE"/>
           </a:p>
@@ -41539,7 +41978,7 @@
           <a:p>
             <a:fld id="{7CE18A8A-CFC4-444F-B700-1F5E27CBBF93}" type="datetime4">
               <a:rPr lang="en-US" smtClean="0"/>
-              <a:t>November 13, 2022</a:t>
+              <a:t>February 22, 2023</a:t>
             </a:fld>
             <a:endParaRPr lang="de-DE"/>
           </a:p>
@@ -42196,7 +42635,7 @@
           <a:p>
             <a:fld id="{89D45D11-DE08-47A0-B5CE-C61E71C015A5}" type="datetime4">
               <a:rPr lang="en-US" smtClean="0"/>
-              <a:t>November 13, 2022</a:t>
+              <a:t>February 22, 2023</a:t>
             </a:fld>
             <a:endParaRPr lang="de-DE" dirty="0"/>
           </a:p>
@@ -42367,7 +42806,7 @@
           <a:p>
             <a:fld id="{3FC4EDF4-751A-4A83-B32D-B6BD44E085C9}" type="datetime4">
               <a:rPr lang="en-US" smtClean="0"/>
-              <a:t>November 13, 2022</a:t>
+              <a:t>February 22, 2023</a:t>
             </a:fld>
             <a:endParaRPr lang="de-DE"/>
           </a:p>
@@ -42946,7 +43385,7 @@
           <a:p>
             <a:fld id="{FBCC0F41-352F-42E2-913B-67B4F5CEF3D1}" type="datetime4">
               <a:rPr lang="en-US" smtClean="0"/>
-              <a:t>November 13, 2022</a:t>
+              <a:t>February 22, 2023</a:t>
             </a:fld>
             <a:endParaRPr lang="de-DE"/>
           </a:p>
@@ -43666,7 +44105,7 @@
           <a:p>
             <a:fld id="{F5BF386D-06BC-46D5-BF27-0A42B36DBD52}" type="datetime4">
               <a:rPr lang="en-US" smtClean="0"/>
-              <a:t>November 13, 2022</a:t>
+              <a:t>February 22, 2023</a:t>
             </a:fld>
             <a:endParaRPr lang="de-DE" dirty="0"/>
           </a:p>
@@ -43783,7 +44222,7 @@
           <p:nvPr userDrawn="1"/>
         </p:nvPicPr>
         <p:blipFill>
-          <a:blip r:embed="rId27">
+          <a:blip r:embed="rId29">
             <a:extLst>
               <a:ext uri="{28A0092B-C50C-407E-A947-70E740481C1C}">
                 <a14:useLocalDpi xmlns:a14="http://schemas.microsoft.com/office/drawing/2010/main" val="0"/>
@@ -43819,7 +44258,7 @@
           <p:nvPr userDrawn="1"/>
         </p:nvPicPr>
         <p:blipFill>
-          <a:blip r:embed="rId28" cstate="hqprint">
+          <a:blip r:embed="rId30" cstate="hqprint">
             <a:extLst>
               <a:ext uri="{28A0092B-C50C-407E-A947-70E740481C1C}">
                 <a14:useLocalDpi xmlns:a14="http://schemas.microsoft.com/office/drawing/2010/main" val="0"/>
@@ -43855,7 +44294,7 @@
           <p:nvPr userDrawn="1"/>
         </p:nvPicPr>
         <p:blipFill>
-          <a:blip r:embed="rId29" cstate="hqprint">
+          <a:blip r:embed="rId31" cstate="hqprint">
             <a:extLst>
               <a:ext uri="{28A0092B-C50C-407E-A947-70E740481C1C}">
                 <a14:useLocalDpi xmlns:a14="http://schemas.microsoft.com/office/drawing/2010/main" val="0"/>
@@ -43891,13 +44330,13 @@
           <p:nvPr userDrawn="1"/>
         </p:nvPicPr>
         <p:blipFill>
-          <a:blip r:embed="rId30">
+          <a:blip r:embed="rId32">
             <a:extLst>
               <a:ext uri="{28A0092B-C50C-407E-A947-70E740481C1C}">
                 <a14:useLocalDpi xmlns:a14="http://schemas.microsoft.com/office/drawing/2010/main" val="0"/>
               </a:ext>
               <a:ext uri="{96DAC541-7B7A-43D3-8B79-37D633B846F1}">
-                <asvg:svgBlip xmlns:asvg="http://schemas.microsoft.com/office/drawing/2016/SVG/main" r:embed="rId31"/>
+                <asvg:svgBlip xmlns:asvg="http://schemas.microsoft.com/office/drawing/2016/SVG/main" r:embed="rId33"/>
               </a:ext>
             </a:extLst>
           </a:blip>
@@ -43935,20 +44374,22 @@
     <p:sldLayoutId id="2147483674" r:id="rId9"/>
     <p:sldLayoutId id="2147483657" r:id="rId10"/>
     <p:sldLayoutId id="2147483654" r:id="rId11"/>
-    <p:sldLayoutId id="2147483655" r:id="rId12"/>
-    <p:sldLayoutId id="2147483662" r:id="rId13"/>
-    <p:sldLayoutId id="2147483661" r:id="rId14"/>
-    <p:sldLayoutId id="2147483669" r:id="rId15"/>
-    <p:sldLayoutId id="2147483651" r:id="rId16"/>
-    <p:sldLayoutId id="2147483670" r:id="rId17"/>
-    <p:sldLayoutId id="2147483659" r:id="rId18"/>
-    <p:sldLayoutId id="2147483656" r:id="rId19"/>
-    <p:sldLayoutId id="2147483649" r:id="rId20"/>
-    <p:sldLayoutId id="2147483668" r:id="rId21"/>
-    <p:sldLayoutId id="2147483660" r:id="rId22"/>
-    <p:sldLayoutId id="2147483666" r:id="rId23"/>
-    <p:sldLayoutId id="2147483671" r:id="rId24"/>
-    <p:sldLayoutId id="2147483676" r:id="rId25"/>
+    <p:sldLayoutId id="2147483677" r:id="rId12"/>
+    <p:sldLayoutId id="2147483678" r:id="rId13"/>
+    <p:sldLayoutId id="2147483655" r:id="rId14"/>
+    <p:sldLayoutId id="2147483662" r:id="rId15"/>
+    <p:sldLayoutId id="2147483661" r:id="rId16"/>
+    <p:sldLayoutId id="2147483669" r:id="rId17"/>
+    <p:sldLayoutId id="2147483651" r:id="rId18"/>
+    <p:sldLayoutId id="2147483670" r:id="rId19"/>
+    <p:sldLayoutId id="2147483659" r:id="rId20"/>
+    <p:sldLayoutId id="2147483656" r:id="rId21"/>
+    <p:sldLayoutId id="2147483649" r:id="rId22"/>
+    <p:sldLayoutId id="2147483668" r:id="rId23"/>
+    <p:sldLayoutId id="2147483660" r:id="rId24"/>
+    <p:sldLayoutId id="2147483666" r:id="rId25"/>
+    <p:sldLayoutId id="2147483671" r:id="rId26"/>
+    <p:sldLayoutId id="2147483676" r:id="rId27"/>
   </p:sldLayoutIdLst>
   <p:hf hdr="0"/>
   <p:txStyles>
@@ -44346,140 +44787,6 @@
     </p:ext>
   </p:extLst>
 </p:sldMaster>
-</file>
-
-<file path=ppt/slides/slide1.xml><?xml version="1.0" encoding="utf-8"?>
-<p:sld xmlns:a="http://schemas.openxmlformats.org/drawingml/2006/main" xmlns:r="http://schemas.openxmlformats.org/officeDocument/2006/relationships" xmlns:p="http://schemas.openxmlformats.org/presentationml/2006/main">
-  <p:cSld>
-    <p:spTree>
-      <p:nvGrpSpPr>
-        <p:cNvPr id="1" name=""/>
-        <p:cNvGrpSpPr/>
-        <p:nvPr/>
-      </p:nvGrpSpPr>
-      <p:grpSpPr>
-        <a:xfrm>
-          <a:off x="0" y="0"/>
-          <a:ext cx="0" cy="0"/>
-          <a:chOff x="0" y="0"/>
-          <a:chExt cx="0" cy="0"/>
-        </a:xfrm>
-      </p:grpSpPr>
-      <p:sp>
-        <p:nvSpPr>
-          <p:cNvPr id="2" name="Titel 1">
-            <a:extLst>
-              <a:ext uri="{FF2B5EF4-FFF2-40B4-BE49-F238E27FC236}">
-                <a16:creationId xmlns:a16="http://schemas.microsoft.com/office/drawing/2014/main" id="{0F1323C2-8005-41B2-8FD8-7203D1F52807}"/>
-              </a:ext>
-            </a:extLst>
-          </p:cNvPr>
-          <p:cNvSpPr>
-            <a:spLocks noGrp="1"/>
-          </p:cNvSpPr>
-          <p:nvPr>
-            <p:ph type="ctrTitle"/>
-          </p:nvPr>
-        </p:nvSpPr>
-        <p:spPr/>
-        <p:txBody>
-          <a:bodyPr/>
-          <a:lstStyle/>
-          <a:p>
-            <a:endParaRPr lang="de-DE"/>
-          </a:p>
-        </p:txBody>
-      </p:sp>
-      <p:sp>
-        <p:nvSpPr>
-          <p:cNvPr id="3" name="Untertitel 2">
-            <a:extLst>
-              <a:ext uri="{FF2B5EF4-FFF2-40B4-BE49-F238E27FC236}">
-                <a16:creationId xmlns:a16="http://schemas.microsoft.com/office/drawing/2014/main" id="{6FBCDA6C-7306-47E8-93E4-2363A85DEE04}"/>
-              </a:ext>
-            </a:extLst>
-          </p:cNvPr>
-          <p:cNvSpPr>
-            <a:spLocks noGrp="1"/>
-          </p:cNvSpPr>
-          <p:nvPr>
-            <p:ph type="subTitle" idx="1"/>
-          </p:nvPr>
-        </p:nvSpPr>
-        <p:spPr/>
-        <p:txBody>
-          <a:bodyPr/>
-          <a:lstStyle/>
-          <a:p>
-            <a:endParaRPr lang="de-DE"/>
-          </a:p>
-        </p:txBody>
-      </p:sp>
-      <p:sp>
-        <p:nvSpPr>
-          <p:cNvPr id="4" name="Fußzeilenplatzhalter 3">
-            <a:extLst>
-              <a:ext uri="{FF2B5EF4-FFF2-40B4-BE49-F238E27FC236}">
-                <a16:creationId xmlns:a16="http://schemas.microsoft.com/office/drawing/2014/main" id="{9F54B773-B7F3-458D-9901-685B6D7BC5B3}"/>
-              </a:ext>
-            </a:extLst>
-          </p:cNvPr>
-          <p:cNvSpPr>
-            <a:spLocks noGrp="1"/>
-          </p:cNvSpPr>
-          <p:nvPr>
-            <p:ph type="ftr" sz="quarter" idx="11"/>
-          </p:nvPr>
-        </p:nvSpPr>
-        <p:spPr/>
-        <p:txBody>
-          <a:bodyPr/>
-          <a:lstStyle/>
-          <a:p>
-            <a:r>
-              <a:rPr lang="en-US"/>
-              <a:t>CONFIDENTIAL – INTERNAL USE ONLY</a:t>
-            </a:r>
-            <a:endParaRPr lang="de-DE" dirty="0"/>
-          </a:p>
-        </p:txBody>
-      </p:sp>
-      <p:sp>
-        <p:nvSpPr>
-          <p:cNvPr id="5" name="Textplatzhalter 4">
-            <a:extLst>
-              <a:ext uri="{FF2B5EF4-FFF2-40B4-BE49-F238E27FC236}">
-                <a16:creationId xmlns:a16="http://schemas.microsoft.com/office/drawing/2014/main" id="{8321A8BE-CCCA-41AF-9D29-5771AD87DABE}"/>
-              </a:ext>
-            </a:extLst>
-          </p:cNvPr>
-          <p:cNvSpPr>
-            <a:spLocks noGrp="1"/>
-          </p:cNvSpPr>
-          <p:nvPr>
-            <p:ph type="body" sz="quarter" idx="13"/>
-          </p:nvPr>
-        </p:nvSpPr>
-        <p:spPr/>
-        <p:txBody>
-          <a:bodyPr/>
-          <a:lstStyle/>
-          <a:p>
-            <a:endParaRPr lang="de-DE"/>
-          </a:p>
-        </p:txBody>
-      </p:sp>
-    </p:spTree>
-    <p:extLst>
-      <p:ext uri="{BB962C8B-B14F-4D97-AF65-F5344CB8AC3E}">
-        <p14:creationId xmlns:p14="http://schemas.microsoft.com/office/powerpoint/2010/main" val="419776492"/>
-      </p:ext>
-    </p:extLst>
-  </p:cSld>
-  <p:clrMapOvr>
-    <a:masterClrMapping/>
-  </p:clrMapOvr>
-</p:sld>
 </file>
 
 <file path=ppt/theme/theme1.xml><?xml version="1.0" encoding="utf-8"?>

</xml_diff>